<commit_message>
first complited prototype of 8th lecture
</commit_message>
<xml_diff>
--- a/lections/cpp_craft_lec_8_pre.pptx
+++ b/lections/cpp_craft_lec_8_pre.pptx
@@ -5,7 +5,7 @@
     <p:sldMasterId id="2147483648" r:id="rId1"/>
   </p:sldMasterIdLst>
   <p:notesMasterIdLst>
-    <p:notesMasterId r:id="rId14"/>
+    <p:notesMasterId r:id="rId20"/>
   </p:notesMasterIdLst>
   <p:sldIdLst>
     <p:sldId id="257" r:id="rId2"/>
@@ -20,6 +20,12 @@
     <p:sldId id="268" r:id="rId11"/>
     <p:sldId id="263" r:id="rId12"/>
     <p:sldId id="265" r:id="rId13"/>
+    <p:sldId id="269" r:id="rId14"/>
+    <p:sldId id="270" r:id="rId15"/>
+    <p:sldId id="271" r:id="rId16"/>
+    <p:sldId id="274" r:id="rId17"/>
+    <p:sldId id="275" r:id="rId18"/>
+    <p:sldId id="272" r:id="rId19"/>
   </p:sldIdLst>
   <p:sldSz cx="9144000" cy="6858000" type="screen4x3"/>
   <p:notesSz cx="6858000" cy="9144000"/>
@@ -1074,6 +1080,13 @@
         </dgm:presLayoutVars>
       </dgm:prSet>
       <dgm:spPr/>
+      <dgm:t>
+        <a:bodyPr/>
+        <a:lstStyle/>
+        <a:p>
+          <a:endParaRPr lang="ru-RU"/>
+        </a:p>
+      </dgm:t>
     </dgm:pt>
     <dgm:pt modelId="{FF5CAA01-8E58-4DDE-8600-498403F19F6D}" type="pres">
       <dgm:prSet presAssocID="{485C602F-6DFB-434F-8D69-EC6A3688DA31}" presName="parSpace" presStyleCnt="0"/>
@@ -1086,6 +1099,13 @@
         </dgm:presLayoutVars>
       </dgm:prSet>
       <dgm:spPr/>
+      <dgm:t>
+        <a:bodyPr/>
+        <a:lstStyle/>
+        <a:p>
+          <a:endParaRPr lang="ru-RU"/>
+        </a:p>
+      </dgm:t>
     </dgm:pt>
     <dgm:pt modelId="{7DE9A916-9398-4AD8-B482-5B4B3D40911B}" type="pres">
       <dgm:prSet presAssocID="{CD07B964-83DE-4BD7-9318-50085C902A9C}" presName="parSpace" presStyleCnt="0"/>
@@ -1098,6 +1118,13 @@
         </dgm:presLayoutVars>
       </dgm:prSet>
       <dgm:spPr/>
+      <dgm:t>
+        <a:bodyPr/>
+        <a:lstStyle/>
+        <a:p>
+          <a:endParaRPr lang="ru-RU"/>
+        </a:p>
+      </dgm:t>
     </dgm:pt>
     <dgm:pt modelId="{709E9685-CE0B-4457-9EDD-99A574073992}" type="pres">
       <dgm:prSet presAssocID="{AB3F422E-A899-4821-B134-C6CAB1F5D96A}" presName="parSpace" presStyleCnt="0"/>
@@ -1110,18 +1137,25 @@
         </dgm:presLayoutVars>
       </dgm:prSet>
       <dgm:spPr/>
+      <dgm:t>
+        <a:bodyPr/>
+        <a:lstStyle/>
+        <a:p>
+          <a:endParaRPr lang="ru-RU"/>
+        </a:p>
+      </dgm:t>
     </dgm:pt>
   </dgm:ptLst>
   <dgm:cxnLst>
-    <dgm:cxn modelId="{5016B8AD-1D82-463A-8A84-AE37FF121F76}" srcId="{C00036FC-348D-4816-AADC-3040AACCD85A}" destId="{7E128102-26F8-4F22-80F2-746841BC4126}" srcOrd="3" destOrd="0" parTransId="{73E697DF-EB80-4603-98C1-2EE248ABDFB2}" sibTransId="{E0520AAF-26F0-4C92-9EDE-5BEF7246D60F}"/>
-    <dgm:cxn modelId="{C5377FB3-F0DB-4795-9D17-54021A7E7C5D}" type="presOf" srcId="{9E0D6E98-0300-44E2-BBA3-91E69963BE59}" destId="{E89ECEDF-1A84-4696-8C58-38A35D4E3DAF}" srcOrd="0" destOrd="0" presId="urn:microsoft.com/office/officeart/2005/8/layout/hChevron3"/>
-    <dgm:cxn modelId="{7ED9C458-8004-4771-8DCC-D8AD95BEAB5F}" srcId="{C00036FC-348D-4816-AADC-3040AACCD85A}" destId="{9E0D6E98-0300-44E2-BBA3-91E69963BE59}" srcOrd="1" destOrd="0" parTransId="{7FF93343-E73D-417B-8ED8-016DC7F2AD54}" sibTransId="{CD07B964-83DE-4BD7-9318-50085C902A9C}"/>
     <dgm:cxn modelId="{857C2558-0C47-45A4-B823-A0A81C09D931}" srcId="{C00036FC-348D-4816-AADC-3040AACCD85A}" destId="{A593D8BE-BA42-4C1F-81A2-A2C394DB377F}" srcOrd="2" destOrd="0" parTransId="{6CD0E77A-A1A1-493C-B20C-6E84928FAE38}" sibTransId="{AB3F422E-A899-4821-B134-C6CAB1F5D96A}"/>
-    <dgm:cxn modelId="{C2998F61-662C-4FE6-AAB6-0037844F8B19}" type="presOf" srcId="{3010C5DD-12C1-4B66-94FE-1C3E0190FA39}" destId="{72F31917-44C6-43FA-891E-874DE1774F00}" srcOrd="0" destOrd="0" presId="urn:microsoft.com/office/officeart/2005/8/layout/hChevron3"/>
-    <dgm:cxn modelId="{09BFFFEB-C0C9-42F6-B57E-3E3ECE428EDC}" srcId="{C00036FC-348D-4816-AADC-3040AACCD85A}" destId="{3010C5DD-12C1-4B66-94FE-1C3E0190FA39}" srcOrd="0" destOrd="0" parTransId="{DCAC9266-3BD3-41EF-9662-27100BF76ED6}" sibTransId="{485C602F-6DFB-434F-8D69-EC6A3688DA31}"/>
+    <dgm:cxn modelId="{5FD0D579-C0C5-4CF6-BD0A-F61452BBDC4D}" type="presOf" srcId="{C00036FC-348D-4816-AADC-3040AACCD85A}" destId="{3CDDC5B0-1317-4EE5-8F3D-376D3276DBE9}" srcOrd="0" destOrd="0" presId="urn:microsoft.com/office/officeart/2005/8/layout/hChevron3"/>
     <dgm:cxn modelId="{DF08A353-3696-496A-9CA5-1E3D70FC8FBA}" type="presOf" srcId="{7E128102-26F8-4F22-80F2-746841BC4126}" destId="{400B722D-846A-4CF5-938D-FF7050CA6D30}" srcOrd="0" destOrd="0" presId="urn:microsoft.com/office/officeart/2005/8/layout/hChevron3"/>
     <dgm:cxn modelId="{3B5FF4DC-BC99-4022-A806-59AD0AF05B9F}" type="presOf" srcId="{A593D8BE-BA42-4C1F-81A2-A2C394DB377F}" destId="{6C592CF1-BDEE-4EFE-B9E3-A1875A87B781}" srcOrd="0" destOrd="0" presId="urn:microsoft.com/office/officeart/2005/8/layout/hChevron3"/>
-    <dgm:cxn modelId="{5FD0D579-C0C5-4CF6-BD0A-F61452BBDC4D}" type="presOf" srcId="{C00036FC-348D-4816-AADC-3040AACCD85A}" destId="{3CDDC5B0-1317-4EE5-8F3D-376D3276DBE9}" srcOrd="0" destOrd="0" presId="urn:microsoft.com/office/officeart/2005/8/layout/hChevron3"/>
+    <dgm:cxn modelId="{5016B8AD-1D82-463A-8A84-AE37FF121F76}" srcId="{C00036FC-348D-4816-AADC-3040AACCD85A}" destId="{7E128102-26F8-4F22-80F2-746841BC4126}" srcOrd="3" destOrd="0" parTransId="{73E697DF-EB80-4603-98C1-2EE248ABDFB2}" sibTransId="{E0520AAF-26F0-4C92-9EDE-5BEF7246D60F}"/>
+    <dgm:cxn modelId="{7ED9C458-8004-4771-8DCC-D8AD95BEAB5F}" srcId="{C00036FC-348D-4816-AADC-3040AACCD85A}" destId="{9E0D6E98-0300-44E2-BBA3-91E69963BE59}" srcOrd="1" destOrd="0" parTransId="{7FF93343-E73D-417B-8ED8-016DC7F2AD54}" sibTransId="{CD07B964-83DE-4BD7-9318-50085C902A9C}"/>
+    <dgm:cxn modelId="{09BFFFEB-C0C9-42F6-B57E-3E3ECE428EDC}" srcId="{C00036FC-348D-4816-AADC-3040AACCD85A}" destId="{3010C5DD-12C1-4B66-94FE-1C3E0190FA39}" srcOrd="0" destOrd="0" parTransId="{DCAC9266-3BD3-41EF-9662-27100BF76ED6}" sibTransId="{485C602F-6DFB-434F-8D69-EC6A3688DA31}"/>
+    <dgm:cxn modelId="{C5377FB3-F0DB-4795-9D17-54021A7E7C5D}" type="presOf" srcId="{9E0D6E98-0300-44E2-BBA3-91E69963BE59}" destId="{E89ECEDF-1A84-4696-8C58-38A35D4E3DAF}" srcOrd="0" destOrd="0" presId="urn:microsoft.com/office/officeart/2005/8/layout/hChevron3"/>
+    <dgm:cxn modelId="{C2998F61-662C-4FE6-AAB6-0037844F8B19}" type="presOf" srcId="{3010C5DD-12C1-4B66-94FE-1C3E0190FA39}" destId="{72F31917-44C6-43FA-891E-874DE1774F00}" srcOrd="0" destOrd="0" presId="urn:microsoft.com/office/officeart/2005/8/layout/hChevron3"/>
     <dgm:cxn modelId="{1EE5EE85-5C3D-49C2-A2E8-D3F5C052C762}" type="presParOf" srcId="{3CDDC5B0-1317-4EE5-8F3D-376D3276DBE9}" destId="{72F31917-44C6-43FA-891E-874DE1774F00}" srcOrd="0" destOrd="0" presId="urn:microsoft.com/office/officeart/2005/8/layout/hChevron3"/>
     <dgm:cxn modelId="{D7425F56-E488-4FE7-AE32-171DCB76BFB6}" type="presParOf" srcId="{3CDDC5B0-1317-4EE5-8F3D-376D3276DBE9}" destId="{FF5CAA01-8E58-4DDE-8600-498403F19F6D}" srcOrd="1" destOrd="0" presId="urn:microsoft.com/office/officeart/2005/8/layout/hChevron3"/>
     <dgm:cxn modelId="{7C6AD3CD-6D28-4AC1-8B5B-7675208854C2}" type="presParOf" srcId="{3CDDC5B0-1317-4EE5-8F3D-376D3276DBE9}" destId="{E89ECEDF-1A84-4696-8C58-38A35D4E3DAF}" srcOrd="2" destOrd="0" presId="urn:microsoft.com/office/officeart/2005/8/layout/hChevron3"/>
@@ -1134,14 +1168,14 @@
   <dgm:whole/>
   <dgm:extLst>
     <a:ext uri="http://schemas.microsoft.com/office/drawing/2008/diagram">
-      <dsp:dataModelExt xmlns:dsp="http://schemas.microsoft.com/office/drawing/2008/diagram" xmlns="" relId="rId7" minVer="http://schemas.openxmlformats.org/drawingml/2006/diagram"/>
+      <dsp:dataModelExt xmlns:dsp="http://schemas.microsoft.com/office/drawing/2008/diagram" relId="rId7" minVer="http://schemas.openxmlformats.org/drawingml/2006/diagram"/>
     </a:ext>
   </dgm:extLst>
 </dgm:dataModel>
 </file>
 
 <file path=ppt/diagrams/drawing1.xml><?xml version="1.0" encoding="utf-8"?>
-<dsp:drawing xmlns:dgm="http://schemas.openxmlformats.org/drawingml/2006/diagram" xmlns:a="http://schemas.openxmlformats.org/drawingml/2006/main" xmlns:dsp="http://schemas.microsoft.com/office/drawing/2008/diagram">
+<dsp:drawing xmlns:dgm="http://schemas.openxmlformats.org/drawingml/2006/diagram" xmlns:dsp="http://schemas.microsoft.com/office/drawing/2008/diagram" xmlns:a="http://schemas.openxmlformats.org/drawingml/2006/main">
   <dsp:spTree>
     <dsp:nvGrpSpPr>
       <dsp:cNvPr id="0" name=""/>
@@ -1222,7 +1256,7 @@
       </dsp:txBody>
       <dsp:txXfrm>
         <a:off x="2299" y="1557888"/>
-        <a:ext cx="2307059" cy="922823"/>
+        <a:ext cx="2076353" cy="922823"/>
       </dsp:txXfrm>
     </dsp:sp>
     <dsp:sp modelId="{E89ECEDF-1A84-4696-8C58-38A35D4E3DAF}">
@@ -1298,8 +1332,8 @@
         </a:p>
       </dsp:txBody>
       <dsp:txXfrm>
-        <a:off x="1847946" y="1557888"/>
-        <a:ext cx="2307059" cy="922823"/>
+        <a:off x="2309358" y="1557888"/>
+        <a:ext cx="1384236" cy="922823"/>
       </dsp:txXfrm>
     </dsp:sp>
     <dsp:sp modelId="{6C592CF1-BDEE-4EFE-B9E3-A1875A87B781}">
@@ -1375,8 +1409,8 @@
         </a:p>
       </dsp:txBody>
       <dsp:txXfrm>
-        <a:off x="3693594" y="1557888"/>
-        <a:ext cx="2307059" cy="922823"/>
+        <a:off x="4155006" y="1557888"/>
+        <a:ext cx="1384236" cy="922823"/>
       </dsp:txXfrm>
     </dsp:sp>
     <dsp:sp modelId="{400B722D-846A-4CF5-938D-FF7050CA6D30}">
@@ -1452,8 +1486,8 @@
         </a:p>
       </dsp:txBody>
       <dsp:txXfrm>
-        <a:off x="5539241" y="1557888"/>
-        <a:ext cx="2307059" cy="922823"/>
+        <a:off x="6000653" y="1557888"/>
+        <a:ext cx="1384236" cy="922823"/>
       </dsp:txXfrm>
     </dsp:sp>
   </dsp:spTree>
@@ -2848,7 +2882,7 @@
           <a:p>
             <a:fld id="{16C38705-5D37-4DCE-B9F8-D500EB5C62D6}" type="datetimeFigureOut">
               <a:rPr lang="en-US" smtClean="0"/>
-              <a:t>11/21/2013</a:t>
+              <a:t>11/24/2013</a:t>
             </a:fld>
             <a:endParaRPr lang="en-US" dirty="0"/>
           </a:p>
@@ -3016,6 +3050,11 @@
         </p:txBody>
       </p:sp>
     </p:spTree>
+    <p:extLst>
+      <p:ext uri="{BB962C8B-B14F-4D97-AF65-F5344CB8AC3E}">
+        <p14:creationId xmlns:p14="http://schemas.microsoft.com/office/powerpoint/2010/main" val="1501875275"/>
+      </p:ext>
+    </p:extLst>
   </p:cSld>
   <p:clrMap bg1="lt1" tx1="dk1" bg2="lt2" tx2="dk2" accent1="accent1" accent2="accent2" accent3="accent3" accent4="accent4" accent5="accent5" accent6="accent6" hlink="hlink" folHlink="folHlink"/>
   <p:notesStyle>
@@ -3191,7 +3230,7 @@
     </p:spTree>
     <p:extLst>
       <p:ext uri="{BB962C8B-B14F-4D97-AF65-F5344CB8AC3E}">
-        <p14:creationId xmlns:p14="http://schemas.microsoft.com/office/powerpoint/2010/main" xmlns="" val="1596205665"/>
+        <p14:creationId xmlns:p14="http://schemas.microsoft.com/office/powerpoint/2010/main" val="1596205665"/>
       </p:ext>
     </p:extLst>
   </p:cSld>
@@ -3860,15 +3899,23 @@
           <a:p>
             <a:r>
               <a:rPr lang="ru-RU" dirty="0" smtClean="0"/>
-              <a:t>Каждый пакет представляет пространство имен(</a:t>
-            </a:r>
-            <a:r>
-              <a:rPr lang="ru-RU" dirty="0" err="1" smtClean="0"/>
-              <a:t>namespace</a:t>
+              <a:t>Каждый пакет </a:t>
             </a:r>
             <a:r>
               <a:rPr lang="ru-RU" dirty="0" smtClean="0"/>
-              <a:t>)</a:t>
+              <a:t>можно представить</a:t>
+            </a:r>
+            <a:r>
+              <a:rPr lang="ru-RU" baseline="0" dirty="0" smtClean="0"/>
+              <a:t> как</a:t>
+            </a:r>
+            <a:r>
+              <a:rPr lang="ru-RU" dirty="0" smtClean="0"/>
+              <a:t> </a:t>
+            </a:r>
+            <a:r>
+              <a:rPr lang="ru-RU" dirty="0" smtClean="0"/>
+              <a:t>пространство имен(namespace)</a:t>
             </a:r>
             <a:r>
               <a:rPr lang="en-US" dirty="0" smtClean="0"/>
@@ -3902,6 +3949,316 @@
         </p:txBody>
       </p:sp>
     </p:spTree>
+  </p:cSld>
+  <p:clrMapOvr>
+    <a:masterClrMapping/>
+  </p:clrMapOvr>
+</p:notes>
+</file>
+
+<file path=ppt/notesSlides/notesSlide7.xml><?xml version="1.0" encoding="utf-8"?>
+<p:notes xmlns:a="http://schemas.openxmlformats.org/drawingml/2006/main" xmlns:r="http://schemas.openxmlformats.org/officeDocument/2006/relationships" xmlns:p="http://schemas.openxmlformats.org/presentationml/2006/main">
+  <p:cSld>
+    <p:spTree>
+      <p:nvGrpSpPr>
+        <p:cNvPr id="1" name=""/>
+        <p:cNvGrpSpPr/>
+        <p:nvPr/>
+      </p:nvGrpSpPr>
+      <p:grpSpPr>
+        <a:xfrm>
+          <a:off x="0" y="0"/>
+          <a:ext cx="0" cy="0"/>
+          <a:chOff x="0" y="0"/>
+          <a:chExt cx="0" cy="0"/>
+        </a:xfrm>
+      </p:grpSpPr>
+      <p:sp>
+        <p:nvSpPr>
+          <p:cNvPr id="2" name="Slide Image Placeholder 1"/>
+          <p:cNvSpPr>
+            <a:spLocks noGrp="1" noRot="1" noChangeAspect="1"/>
+          </p:cNvSpPr>
+          <p:nvPr>
+            <p:ph type="sldImg"/>
+          </p:nvPr>
+        </p:nvSpPr>
+        <p:spPr/>
+      </p:sp>
+      <p:sp>
+        <p:nvSpPr>
+          <p:cNvPr id="3" name="Notes Placeholder 2"/>
+          <p:cNvSpPr>
+            <a:spLocks noGrp="1"/>
+          </p:cNvSpPr>
+          <p:nvPr>
+            <p:ph type="body" idx="1"/>
+          </p:nvPr>
+        </p:nvSpPr>
+        <p:spPr/>
+        <p:txBody>
+          <a:bodyPr/>
+          <a:lstStyle/>
+          <a:p>
+            <a:r>
+              <a:rPr lang="ru-RU" dirty="0" smtClean="0"/>
+              <a:t>Диаграммы взаимодействия (interaction diagrams) описывают взаимо</a:t>
+            </a:r>
+          </a:p>
+          <a:p>
+            <a:r>
+              <a:rPr lang="ru-RU" dirty="0" smtClean="0"/>
+              <a:t>действие групп объектов в различных условиях их поведения.</a:t>
+            </a:r>
+            <a:endParaRPr lang="ru-RU" dirty="0"/>
+          </a:p>
+        </p:txBody>
+      </p:sp>
+      <p:sp>
+        <p:nvSpPr>
+          <p:cNvPr id="4" name="Slide Number Placeholder 3"/>
+          <p:cNvSpPr>
+            <a:spLocks noGrp="1"/>
+          </p:cNvSpPr>
+          <p:nvPr>
+            <p:ph type="sldNum" sz="quarter" idx="10"/>
+          </p:nvPr>
+        </p:nvSpPr>
+        <p:spPr/>
+        <p:txBody>
+          <a:bodyPr/>
+          <a:lstStyle/>
+          <a:p>
+            <a:fld id="{9EE23259-A994-4750-8408-65A858EA170A}" type="slidenum">
+              <a:rPr lang="en-US" smtClean="0"/>
+              <a:t>14</a:t>
+            </a:fld>
+            <a:endParaRPr lang="en-US" dirty="0"/>
+          </a:p>
+        </p:txBody>
+      </p:sp>
+    </p:spTree>
+    <p:extLst>
+      <p:ext uri="{BB962C8B-B14F-4D97-AF65-F5344CB8AC3E}">
+        <p14:creationId xmlns:p14="http://schemas.microsoft.com/office/powerpoint/2010/main" val="2248831529"/>
+      </p:ext>
+    </p:extLst>
+  </p:cSld>
+  <p:clrMapOvr>
+    <a:masterClrMapping/>
+  </p:clrMapOvr>
+</p:notes>
+</file>
+
+<file path=ppt/notesSlides/notesSlide8.xml><?xml version="1.0" encoding="utf-8"?>
+<p:notes xmlns:a="http://schemas.openxmlformats.org/drawingml/2006/main" xmlns:r="http://schemas.openxmlformats.org/officeDocument/2006/relationships" xmlns:p="http://schemas.openxmlformats.org/presentationml/2006/main">
+  <p:cSld>
+    <p:spTree>
+      <p:nvGrpSpPr>
+        <p:cNvPr id="1" name=""/>
+        <p:cNvGrpSpPr/>
+        <p:nvPr/>
+      </p:nvGrpSpPr>
+      <p:grpSpPr>
+        <a:xfrm>
+          <a:off x="0" y="0"/>
+          <a:ext cx="0" cy="0"/>
+          <a:chOff x="0" y="0"/>
+          <a:chExt cx="0" cy="0"/>
+        </a:xfrm>
+      </p:grpSpPr>
+      <p:sp>
+        <p:nvSpPr>
+          <p:cNvPr id="2" name="Slide Image Placeholder 1"/>
+          <p:cNvSpPr>
+            <a:spLocks noGrp="1" noRot="1" noChangeAspect="1"/>
+          </p:cNvSpPr>
+          <p:nvPr>
+            <p:ph type="sldImg"/>
+          </p:nvPr>
+        </p:nvSpPr>
+        <p:spPr/>
+      </p:sp>
+      <p:sp>
+        <p:nvSpPr>
+          <p:cNvPr id="3" name="Notes Placeholder 2"/>
+          <p:cNvSpPr>
+            <a:spLocks noGrp="1"/>
+          </p:cNvSpPr>
+          <p:nvPr>
+            <p:ph type="body" idx="1"/>
+          </p:nvPr>
+        </p:nvSpPr>
+        <p:spPr/>
+        <p:txBody>
+          <a:bodyPr/>
+          <a:lstStyle/>
+          <a:p>
+            <a:r>
+              <a:rPr lang="ru-RU" dirty="0" smtClean="0"/>
+              <a:t>Также есть возможность</a:t>
+            </a:r>
+            <a:r>
+              <a:rPr lang="ru-RU" baseline="0" dirty="0" smtClean="0"/>
+              <a:t> представлять </a:t>
+            </a:r>
+            <a:r>
+              <a:rPr lang="ru-RU" b="1" baseline="0" dirty="0" smtClean="0"/>
+              <a:t>циклы</a:t>
+            </a:r>
+            <a:r>
+              <a:rPr lang="ru-RU" baseline="0" dirty="0" smtClean="0"/>
+              <a:t> и </a:t>
+            </a:r>
+            <a:r>
+              <a:rPr lang="ru-RU" b="1" baseline="0" dirty="0" smtClean="0"/>
+              <a:t>условия</a:t>
+            </a:r>
+          </a:p>
+          <a:p>
+            <a:r>
+              <a:rPr lang="ru-RU" b="0" baseline="0" dirty="0" smtClean="0"/>
+              <a:t>Исползование </a:t>
+            </a:r>
+            <a:r>
+              <a:rPr lang="en-US" b="1" baseline="0" dirty="0" smtClean="0"/>
+              <a:t>CRC</a:t>
+            </a:r>
+            <a:r>
+              <a:rPr lang="ru-RU" b="1" baseline="0" dirty="0" smtClean="0"/>
+              <a:t> карточек</a:t>
+            </a:r>
+          </a:p>
+          <a:p>
+            <a:r>
+              <a:rPr lang="ru-RU" b="0" baseline="0" dirty="0" smtClean="0"/>
+              <a:t>Асинхронные вызовы, пример из домашнего задания</a:t>
+            </a:r>
+            <a:endParaRPr lang="ru-RU" b="0" dirty="0"/>
+          </a:p>
+        </p:txBody>
+      </p:sp>
+      <p:sp>
+        <p:nvSpPr>
+          <p:cNvPr id="4" name="Slide Number Placeholder 3"/>
+          <p:cNvSpPr>
+            <a:spLocks noGrp="1"/>
+          </p:cNvSpPr>
+          <p:nvPr>
+            <p:ph type="sldNum" sz="quarter" idx="10"/>
+          </p:nvPr>
+        </p:nvSpPr>
+        <p:spPr/>
+        <p:txBody>
+          <a:bodyPr/>
+          <a:lstStyle/>
+          <a:p>
+            <a:fld id="{9EE23259-A994-4750-8408-65A858EA170A}" type="slidenum">
+              <a:rPr lang="en-US" smtClean="0"/>
+              <a:t>15</a:t>
+            </a:fld>
+            <a:endParaRPr lang="en-US" dirty="0"/>
+          </a:p>
+        </p:txBody>
+      </p:sp>
+    </p:spTree>
+    <p:extLst>
+      <p:ext uri="{BB962C8B-B14F-4D97-AF65-F5344CB8AC3E}">
+        <p14:creationId xmlns:p14="http://schemas.microsoft.com/office/powerpoint/2010/main" val="2587734410"/>
+      </p:ext>
+    </p:extLst>
+  </p:cSld>
+  <p:clrMapOvr>
+    <a:masterClrMapping/>
+  </p:clrMapOvr>
+</p:notes>
+</file>
+
+<file path=ppt/notesSlides/notesSlide9.xml><?xml version="1.0" encoding="utf-8"?>
+<p:notes xmlns:a="http://schemas.openxmlformats.org/drawingml/2006/main" xmlns:r="http://schemas.openxmlformats.org/officeDocument/2006/relationships" xmlns:p="http://schemas.openxmlformats.org/presentationml/2006/main">
+  <p:cSld>
+    <p:spTree>
+      <p:nvGrpSpPr>
+        <p:cNvPr id="1" name=""/>
+        <p:cNvGrpSpPr/>
+        <p:nvPr/>
+      </p:nvGrpSpPr>
+      <p:grpSpPr>
+        <a:xfrm>
+          <a:off x="0" y="0"/>
+          <a:ext cx="0" cy="0"/>
+          <a:chOff x="0" y="0"/>
+          <a:chExt cx="0" cy="0"/>
+        </a:xfrm>
+      </p:grpSpPr>
+      <p:sp>
+        <p:nvSpPr>
+          <p:cNvPr id="2" name="Slide Image Placeholder 1"/>
+          <p:cNvSpPr>
+            <a:spLocks noGrp="1" noRot="1" noChangeAspect="1"/>
+          </p:cNvSpPr>
+          <p:nvPr>
+            <p:ph type="sldImg"/>
+          </p:nvPr>
+        </p:nvSpPr>
+        <p:spPr/>
+      </p:sp>
+      <p:sp>
+        <p:nvSpPr>
+          <p:cNvPr id="3" name="Notes Placeholder 2"/>
+          <p:cNvSpPr>
+            <a:spLocks noGrp="1"/>
+          </p:cNvSpPr>
+          <p:nvPr>
+            <p:ph type="body" idx="1"/>
+          </p:nvPr>
+        </p:nvSpPr>
+        <p:spPr/>
+        <p:txBody>
+          <a:bodyPr/>
+          <a:lstStyle/>
+          <a:p>
+            <a:r>
+              <a:rPr lang="ru-RU" dirty="0" smtClean="0"/>
+              <a:t>Разработка ПО невозможна</a:t>
+            </a:r>
+            <a:r>
+              <a:rPr lang="ru-RU" baseline="0" dirty="0" smtClean="0"/>
+              <a:t> без менеджента. Требуется следование каким-либо правилам</a:t>
+            </a:r>
+            <a:endParaRPr lang="ru-RU" dirty="0"/>
+          </a:p>
+        </p:txBody>
+      </p:sp>
+      <p:sp>
+        <p:nvSpPr>
+          <p:cNvPr id="4" name="Slide Number Placeholder 3"/>
+          <p:cNvSpPr>
+            <a:spLocks noGrp="1"/>
+          </p:cNvSpPr>
+          <p:nvPr>
+            <p:ph type="sldNum" sz="quarter" idx="10"/>
+          </p:nvPr>
+        </p:nvSpPr>
+        <p:spPr/>
+        <p:txBody>
+          <a:bodyPr/>
+          <a:lstStyle/>
+          <a:p>
+            <a:fld id="{9EE23259-A994-4750-8408-65A858EA170A}" type="slidenum">
+              <a:rPr lang="en-US" smtClean="0"/>
+              <a:t>16</a:t>
+            </a:fld>
+            <a:endParaRPr lang="en-US" dirty="0"/>
+          </a:p>
+        </p:txBody>
+      </p:sp>
+    </p:spTree>
+    <p:extLst>
+      <p:ext uri="{BB962C8B-B14F-4D97-AF65-F5344CB8AC3E}">
+        <p14:creationId xmlns:p14="http://schemas.microsoft.com/office/powerpoint/2010/main" val="1735711224"/>
+      </p:ext>
+    </p:extLst>
   </p:cSld>
   <p:clrMapOvr>
     <a:masterClrMapping/>
@@ -4090,7 +4447,7 @@
           <a:p>
             <a:fld id="{A0E39848-FCB8-45A2-B89A-8D31300E80D6}" type="datetimeFigureOut">
               <a:rPr lang="en-US" smtClean="0"/>
-              <a:t>11/21/2013</a:t>
+              <a:t>11/24/2013</a:t>
             </a:fld>
             <a:endParaRPr lang="en-US" dirty="0"/>
           </a:p>
@@ -4255,7 +4612,7 @@
           <a:p>
             <a:fld id="{A0E39848-FCB8-45A2-B89A-8D31300E80D6}" type="datetimeFigureOut">
               <a:rPr lang="en-US" smtClean="0"/>
-              <a:t>11/21/2013</a:t>
+              <a:t>11/24/2013</a:t>
             </a:fld>
             <a:endParaRPr lang="en-US" dirty="0"/>
           </a:p>
@@ -4430,7 +4787,7 @@
           <a:p>
             <a:fld id="{A0E39848-FCB8-45A2-B89A-8D31300E80D6}" type="datetimeFigureOut">
               <a:rPr lang="en-US" smtClean="0"/>
-              <a:t>11/21/2013</a:t>
+              <a:t>11/24/2013</a:t>
             </a:fld>
             <a:endParaRPr lang="en-US" dirty="0"/>
           </a:p>
@@ -4595,7 +4952,7 @@
           <a:p>
             <a:fld id="{A0E39848-FCB8-45A2-B89A-8D31300E80D6}" type="datetimeFigureOut">
               <a:rPr lang="en-US" smtClean="0"/>
-              <a:t>11/21/2013</a:t>
+              <a:t>11/24/2013</a:t>
             </a:fld>
             <a:endParaRPr lang="en-US" dirty="0"/>
           </a:p>
@@ -4836,7 +5193,7 @@
           <a:p>
             <a:fld id="{A0E39848-FCB8-45A2-B89A-8D31300E80D6}" type="datetimeFigureOut">
               <a:rPr lang="en-US" smtClean="0"/>
-              <a:t>11/21/2013</a:t>
+              <a:t>11/24/2013</a:t>
             </a:fld>
             <a:endParaRPr lang="en-US" dirty="0"/>
           </a:p>
@@ -5119,7 +5476,7 @@
           <a:p>
             <a:fld id="{A0E39848-FCB8-45A2-B89A-8D31300E80D6}" type="datetimeFigureOut">
               <a:rPr lang="en-US" smtClean="0"/>
-              <a:t>11/21/2013</a:t>
+              <a:t>11/24/2013</a:t>
             </a:fld>
             <a:endParaRPr lang="en-US" dirty="0"/>
           </a:p>
@@ -5536,7 +5893,7 @@
           <a:p>
             <a:fld id="{A0E39848-FCB8-45A2-B89A-8D31300E80D6}" type="datetimeFigureOut">
               <a:rPr lang="en-US" smtClean="0"/>
-              <a:t>11/21/2013</a:t>
+              <a:t>11/24/2013</a:t>
             </a:fld>
             <a:endParaRPr lang="en-US" dirty="0"/>
           </a:p>
@@ -5649,7 +6006,7 @@
           <a:p>
             <a:fld id="{A0E39848-FCB8-45A2-B89A-8D31300E80D6}" type="datetimeFigureOut">
               <a:rPr lang="en-US" smtClean="0"/>
-              <a:t>11/21/2013</a:t>
+              <a:t>11/24/2013</a:t>
             </a:fld>
             <a:endParaRPr lang="en-US" dirty="0"/>
           </a:p>
@@ -5739,7 +6096,7 @@
           <a:p>
             <a:fld id="{A0E39848-FCB8-45A2-B89A-8D31300E80D6}" type="datetimeFigureOut">
               <a:rPr lang="en-US" smtClean="0"/>
-              <a:t>11/21/2013</a:t>
+              <a:t>11/24/2013</a:t>
             </a:fld>
             <a:endParaRPr lang="en-US" dirty="0"/>
           </a:p>
@@ -6011,7 +6368,7 @@
           <a:p>
             <a:fld id="{A0E39848-FCB8-45A2-B89A-8D31300E80D6}" type="datetimeFigureOut">
               <a:rPr lang="en-US" smtClean="0"/>
-              <a:t>11/21/2013</a:t>
+              <a:t>11/24/2013</a:t>
             </a:fld>
             <a:endParaRPr lang="en-US" dirty="0"/>
           </a:p>
@@ -6259,7 +6616,7 @@
           <a:p>
             <a:fld id="{A0E39848-FCB8-45A2-B89A-8D31300E80D6}" type="datetimeFigureOut">
               <a:rPr lang="en-US" smtClean="0"/>
-              <a:t>11/21/2013</a:t>
+              <a:t>11/24/2013</a:t>
             </a:fld>
             <a:endParaRPr lang="en-US" dirty="0"/>
           </a:p>
@@ -6467,7 +6824,7 @@
           <a:p>
             <a:fld id="{A0E39848-FCB8-45A2-B89A-8D31300E80D6}" type="datetimeFigureOut">
               <a:rPr lang="en-US" smtClean="0"/>
-              <a:t>11/21/2013</a:t>
+              <a:t>11/24/2013</a:t>
             </a:fld>
             <a:endParaRPr lang="en-US" dirty="0"/>
           </a:p>
@@ -6858,11 +7215,7 @@
             </a:r>
             <a:r>
               <a:rPr lang="en-US" dirty="0" smtClean="0"/>
-              <a:t>Craft: </a:t>
-            </a:r>
-            <a:r>
-              <a:rPr lang="en-US" dirty="0" smtClean="0"/>
-              <a:t>#1000</a:t>
+              <a:t>Craft: #1000</a:t>
             </a:r>
             <a:endParaRPr lang="en-US" dirty="0"/>
           </a:p>
@@ -6889,7 +7242,6 @@
               <a:rPr lang="ru-RU" dirty="0" smtClean="0"/>
               <a:t>Пример проектирования системы обработки большого количества информации</a:t>
             </a:r>
-            <a:endParaRPr lang="ru-RU" dirty="0" smtClean="0"/>
           </a:p>
         </p:txBody>
       </p:sp>
@@ -7380,47 +7732,6 @@
           <a:chExt cx="0" cy="0"/>
         </a:xfrm>
       </p:grpSpPr>
-      <p:sp>
-        <p:nvSpPr>
-          <p:cNvPr id="2" name="Заголовок 1"/>
-          <p:cNvSpPr>
-            <a:spLocks noGrp="1"/>
-          </p:cNvSpPr>
-          <p:nvPr>
-            <p:ph type="title"/>
-          </p:nvPr>
-        </p:nvSpPr>
-        <p:spPr>
-          <a:xfrm>
-            <a:off x="4953000" y="457200"/>
-            <a:ext cx="5562600" cy="563562"/>
-          </a:xfrm>
-        </p:spPr>
-        <p:txBody>
-          <a:bodyPr>
-            <a:normAutofit fontScale="90000"/>
-          </a:bodyPr>
-          <a:lstStyle/>
-          <a:p>
-            <a:r>
-              <a:rPr lang="ru-RU" dirty="0" smtClean="0"/>
-              <a:t>Диаграмма </a:t>
-            </a:r>
-            <a:r>
-              <a:rPr lang="en-US" dirty="0" smtClean="0"/>
-              <a:t/>
-            </a:r>
-            <a:br>
-              <a:rPr lang="en-US" dirty="0" smtClean="0"/>
-            </a:br>
-            <a:r>
-              <a:rPr lang="ru-RU" dirty="0" smtClean="0"/>
-              <a:t>классов</a:t>
-            </a:r>
-            <a:endParaRPr lang="en-US" dirty="0"/>
-          </a:p>
-        </p:txBody>
-      </p:sp>
       <p:pic>
         <p:nvPicPr>
           <p:cNvPr id="5" name="Рисунок 4" descr="class diagram.jpg"/>
@@ -7445,6 +7756,118 @@
           </a:prstGeom>
         </p:spPr>
       </p:pic>
+      <p:sp>
+        <p:nvSpPr>
+          <p:cNvPr id="2" name="Заголовок 1"/>
+          <p:cNvSpPr>
+            <a:spLocks noGrp="1"/>
+          </p:cNvSpPr>
+          <p:nvPr>
+            <p:ph type="title"/>
+          </p:nvPr>
+        </p:nvSpPr>
+        <p:spPr>
+          <a:xfrm>
+            <a:off x="4724400" y="457200"/>
+            <a:ext cx="5562600" cy="563562"/>
+          </a:xfrm>
+        </p:spPr>
+        <p:txBody>
+          <a:bodyPr>
+            <a:normAutofit fontScale="90000"/>
+          </a:bodyPr>
+          <a:lstStyle/>
+          <a:p>
+            <a:r>
+              <a:rPr lang="ru-RU" dirty="0" smtClean="0"/>
+              <a:t>Диаграмма </a:t>
+            </a:r>
+            <a:r>
+              <a:rPr lang="en-US" dirty="0" smtClean="0"/>
+              <a:t/>
+            </a:r>
+            <a:br>
+              <a:rPr lang="en-US" dirty="0" smtClean="0"/>
+            </a:br>
+            <a:r>
+              <a:rPr lang="ru-RU" dirty="0" smtClean="0"/>
+              <a:t>классов</a:t>
+            </a:r>
+            <a:endParaRPr lang="en-US" dirty="0"/>
+          </a:p>
+        </p:txBody>
+      </p:sp>
+      <p:sp>
+        <p:nvSpPr>
+          <p:cNvPr id="3" name="Rectangle 2"/>
+          <p:cNvSpPr/>
+          <p:nvPr/>
+        </p:nvSpPr>
+        <p:spPr>
+          <a:xfrm>
+            <a:off x="3810000" y="6412938"/>
+            <a:ext cx="5150769" cy="323165"/>
+          </a:xfrm>
+          <a:prstGeom prst="rect">
+            <a:avLst/>
+          </a:prstGeom>
+        </p:spPr>
+        <p:txBody>
+          <a:bodyPr wrap="none">
+            <a:spAutoFit/>
+          </a:bodyPr>
+          <a:lstStyle/>
+          <a:p>
+            <a:r>
+              <a:rPr lang="ru-RU" sz="1500" dirty="0"/>
+              <a:t>Мартин Фаулер «</a:t>
+            </a:r>
+            <a:r>
+              <a:rPr lang="en-US" sz="1500" dirty="0"/>
+              <a:t>UML. </a:t>
+            </a:r>
+            <a:r>
+              <a:rPr lang="ru-RU" sz="1500" dirty="0"/>
+              <a:t>Основы</a:t>
+            </a:r>
+            <a:r>
+              <a:rPr lang="ru-RU" sz="1500" dirty="0" smtClean="0"/>
+              <a:t>» глава «Диаграммы классов»</a:t>
+            </a:r>
+            <a:endParaRPr lang="en-US" sz="1500" dirty="0"/>
+          </a:p>
+        </p:txBody>
+      </p:sp>
+      <p:cxnSp>
+        <p:nvCxnSpPr>
+          <p:cNvPr id="6" name="Прямая соединительная линия 6"/>
+          <p:cNvCxnSpPr/>
+          <p:nvPr/>
+        </p:nvCxnSpPr>
+        <p:spPr>
+          <a:xfrm>
+            <a:off x="3581400" y="6412938"/>
+            <a:ext cx="5181600" cy="0"/>
+          </a:xfrm>
+          <a:prstGeom prst="line">
+            <a:avLst/>
+          </a:prstGeom>
+        </p:spPr>
+        <p:style>
+          <a:lnRef idx="1">
+            <a:schemeClr val="accent1"/>
+          </a:lnRef>
+          <a:fillRef idx="0">
+            <a:schemeClr val="accent1"/>
+          </a:fillRef>
+          <a:effectRef idx="0">
+            <a:schemeClr val="accent1"/>
+          </a:effectRef>
+          <a:fontRef idx="minor">
+            <a:schemeClr val="tx1"/>
+          </a:fontRef>
+        </p:style>
+      </p:cxnSp>
     </p:spTree>
   </p:cSld>
   <p:clrMapOvr>
@@ -7460,7 +7883,7 @@
 </p:sld>
 </file>
 
-<file path=ppt/slides/slide2.xml><?xml version="1.0" encoding="utf-8"?>
+<file path=ppt/slides/slide13.xml><?xml version="1.0" encoding="utf-8"?>
 <p:sld xmlns:a="http://schemas.openxmlformats.org/drawingml/2006/main" xmlns:r="http://schemas.openxmlformats.org/officeDocument/2006/relationships" xmlns:p="http://schemas.openxmlformats.org/presentationml/2006/main">
   <p:cSld>
     <p:spTree>
@@ -7479,7 +7902,7 @@
       </p:grpSpPr>
       <p:sp>
         <p:nvSpPr>
-          <p:cNvPr id="2" name="Заголовок 1"/>
+          <p:cNvPr id="2" name="Title 1"/>
           <p:cNvSpPr>
             <a:spLocks noGrp="1"/>
           </p:cNvSpPr>
@@ -7494,15 +7917,15 @@
           <a:p>
             <a:r>
               <a:rPr lang="ru-RU" dirty="0" smtClean="0"/>
-              <a:t>Литература</a:t>
-            </a:r>
-            <a:endParaRPr lang="en-US" dirty="0"/>
-          </a:p>
-        </p:txBody>
-      </p:sp>
-      <p:sp>
-        <p:nvSpPr>
-          <p:cNvPr id="3" name="Содержимое 2"/>
+              <a:t>Атрибут</a:t>
+            </a:r>
+            <a:endParaRPr lang="ru-RU" dirty="0"/>
+          </a:p>
+        </p:txBody>
+      </p:sp>
+      <p:sp>
+        <p:nvSpPr>
+          <p:cNvPr id="3" name="Content Placeholder 2"/>
           <p:cNvSpPr>
             <a:spLocks noGrp="1"/>
           </p:cNvSpPr>
@@ -7512,59 +7935,154 @@
         </p:nvSpPr>
         <p:spPr/>
         <p:txBody>
-          <a:bodyPr/>
+          <a:bodyPr>
+            <a:normAutofit/>
+          </a:bodyPr>
           <a:lstStyle/>
           <a:p>
             <a:r>
+              <a:rPr lang="ru-RU" dirty="0"/>
+              <a:t>видимость имя: тип кратность = значение по </a:t>
+            </a:r>
+            <a:r>
               <a:rPr lang="ru-RU" dirty="0" smtClean="0"/>
-              <a:t>Бьерн Страуструп «Язык программирования </a:t>
+              <a:t>умолчанию </a:t>
+            </a:r>
+            <a:r>
+              <a:rPr lang="ru-RU" dirty="0"/>
+              <a:t>{строка свойств</a:t>
+            </a:r>
+            <a:r>
+              <a:rPr lang="ru-RU" dirty="0" smtClean="0"/>
+              <a:t>}</a:t>
+            </a:r>
+          </a:p>
+          <a:p>
+            <a:endParaRPr lang="ru-RU" dirty="0"/>
+          </a:p>
+          <a:p>
+            <a:r>
+              <a:rPr lang="ru-RU" dirty="0"/>
+              <a:t>-</a:t>
+            </a:r>
+            <a:r>
+              <a:rPr lang="ru-RU" dirty="0" smtClean="0"/>
+              <a:t> </a:t>
             </a:r>
             <a:r>
               <a:rPr lang="en-US" dirty="0" smtClean="0"/>
-              <a:t>C++</a:t>
+              <a:t>text</a:t>
             </a:r>
             <a:r>
               <a:rPr lang="ru-RU" dirty="0" smtClean="0"/>
-              <a:t>» - глава «</a:t>
+              <a:t>: </a:t>
+            </a:r>
+            <a:r>
+              <a:rPr lang="en-US" dirty="0" smtClean="0"/>
+              <a:t>string </a:t>
+            </a:r>
+            <a:r>
+              <a:rPr lang="en-US" dirty="0"/>
+              <a:t>[1] = </a:t>
+            </a:r>
+            <a:r>
+              <a:rPr lang="en-US" dirty="0" smtClean="0"/>
+              <a:t>“</a:t>
+            </a:r>
+            <a:r>
+              <a:rPr lang="en-US" dirty="0" err="1" smtClean="0"/>
+              <a:t>no_name</a:t>
             </a:r>
             <a:r>
               <a:rPr lang="ru-RU" dirty="0" smtClean="0"/>
-              <a:t>Разработка и проектирование</a:t>
+              <a:t>"  </a:t>
+            </a:r>
+            <a:r>
+              <a:rPr lang="en-US" dirty="0" smtClean="0"/>
+              <a:t> </a:t>
             </a:r>
             <a:r>
               <a:rPr lang="ru-RU" dirty="0" smtClean="0"/>
-              <a:t>»</a:t>
-            </a:r>
-          </a:p>
-          <a:p>
+              <a:t>{</a:t>
+            </a:r>
+            <a:r>
+              <a:rPr lang="en-US" dirty="0" smtClean="0"/>
+              <a:t>read only}</a:t>
+            </a:r>
+          </a:p>
+          <a:p>
+            <a:r>
+              <a:rPr lang="en-US" dirty="0"/>
+              <a:t>+</a:t>
+            </a:r>
             <a:r>
               <a:rPr lang="ru-RU" dirty="0" smtClean="0"/>
-              <a:t>Мартин </a:t>
-            </a:r>
-            <a:r>
-              <a:rPr lang="ru-RU" dirty="0" err="1" smtClean="0"/>
-              <a:t>Фаулер</a:t>
+              <a:t> </a:t>
+            </a:r>
+            <a:r>
+              <a:rPr lang="en-US" dirty="0" err="1" smtClean="0"/>
+              <a:t>order_list</a:t>
             </a:r>
             <a:r>
               <a:rPr lang="ru-RU" dirty="0" smtClean="0"/>
-              <a:t> «</a:t>
+              <a:t>: </a:t>
             </a:r>
             <a:r>
               <a:rPr lang="en-US" dirty="0" smtClean="0"/>
-              <a:t>UML. </a:t>
+              <a:t>vector[1</a:t>
+            </a:r>
+            <a:r>
+              <a:rPr lang="en-US" dirty="0"/>
+              <a:t>] </a:t>
+            </a:r>
+            <a:r>
+              <a:rPr lang="en-US" dirty="0" smtClean="0"/>
+              <a:t>{ordered}</a:t>
+            </a:r>
+          </a:p>
+          <a:p>
+            <a:r>
+              <a:rPr lang="en-US" dirty="0" smtClean="0"/>
+              <a:t>#</a:t>
             </a:r>
             <a:r>
               <a:rPr lang="ru-RU" dirty="0" smtClean="0"/>
-              <a:t>Основы»</a:t>
-            </a:r>
-            <a:endParaRPr lang="en-US" dirty="0" smtClean="0"/>
-          </a:p>
-          <a:p>
-            <a:endParaRPr lang="en-US" dirty="0"/>
+              <a:t> </a:t>
+            </a:r>
+            <a:r>
+              <a:rPr lang="en-US" dirty="0" err="1" smtClean="0"/>
+              <a:t>my_map</a:t>
+            </a:r>
+            <a:r>
+              <a:rPr lang="ru-RU" dirty="0" smtClean="0"/>
+              <a:t>: </a:t>
+            </a:r>
+            <a:r>
+              <a:rPr lang="en-US" dirty="0" smtClean="0"/>
+              <a:t>map[1</a:t>
+            </a:r>
+            <a:r>
+              <a:rPr lang="en-US" dirty="0"/>
+              <a:t>] </a:t>
+            </a:r>
+            <a:r>
+              <a:rPr lang="ru-RU" dirty="0" smtClean="0"/>
+              <a:t>{</a:t>
+            </a:r>
+            <a:r>
+              <a:rPr lang="en-US" dirty="0" smtClean="0"/>
+              <a:t>unique}</a:t>
+            </a:r>
+            <a:endParaRPr lang="ru-RU" dirty="0"/>
           </a:p>
         </p:txBody>
       </p:sp>
     </p:spTree>
+    <p:extLst>
+      <p:ext uri="{BB962C8B-B14F-4D97-AF65-F5344CB8AC3E}">
+        <p14:creationId xmlns:p14="http://schemas.microsoft.com/office/powerpoint/2010/main" val="1462525534"/>
+      </p:ext>
+    </p:extLst>
   </p:cSld>
   <p:clrMapOvr>
     <a:masterClrMapping/>
@@ -7579,7 +8097,7 @@
 </p:sld>
 </file>
 
-<file path=ppt/slides/slide3.xml><?xml version="1.0" encoding="utf-8"?>
+<file path=ppt/slides/slide14.xml><?xml version="1.0" encoding="utf-8"?>
 <p:sld xmlns:a="http://schemas.openxmlformats.org/drawingml/2006/main" xmlns:r="http://schemas.openxmlformats.org/officeDocument/2006/relationships" xmlns:p="http://schemas.openxmlformats.org/presentationml/2006/main">
   <p:cSld>
     <p:spTree>
@@ -7598,7 +8116,7 @@
       </p:grpSpPr>
       <p:sp>
         <p:nvSpPr>
-          <p:cNvPr id="2" name="Заголовок 1"/>
+          <p:cNvPr id="2" name="Title 1"/>
           <p:cNvSpPr>
             <a:spLocks noGrp="1"/>
           </p:cNvSpPr>
@@ -7613,29 +8131,82 @@
           <a:p>
             <a:r>
               <a:rPr lang="ru-RU" dirty="0" smtClean="0"/>
-              <a:t>Разработка ПО</a:t>
-            </a:r>
-            <a:endParaRPr lang="en-US" dirty="0"/>
-          </a:p>
-        </p:txBody>
-      </p:sp>
-      <p:graphicFrame>
-        <p:nvGraphicFramePr>
-          <p:cNvPr id="6" name="Схема 5"/>
-          <p:cNvGraphicFramePr/>
+              <a:t>Диаграмма последовательности</a:t>
+            </a:r>
+            <a:endParaRPr lang="ru-RU" dirty="0"/>
+          </a:p>
+        </p:txBody>
+      </p:sp>
+      <p:pic>
+        <p:nvPicPr>
+          <p:cNvPr id="1026" name="Picture 2"/>
+          <p:cNvPicPr>
+            <a:picLocks noChangeAspect="1" noChangeArrowheads="1"/>
+          </p:cNvPicPr>
           <p:nvPr/>
-        </p:nvGraphicFramePr>
-        <p:xfrm>
-          <a:off x="609600" y="1295400"/>
-          <a:ext cx="7848600" cy="4038600"/>
-        </p:xfrm>
-        <a:graphic>
-          <a:graphicData uri="http://schemas.openxmlformats.org/drawingml/2006/diagram">
-            <dgm:relIds xmlns:dgm="http://schemas.openxmlformats.org/drawingml/2006/diagram" xmlns:r="http://schemas.openxmlformats.org/officeDocument/2006/relationships" r:dm="rId3" r:lo="rId4" r:qs="rId5" r:cs="rId6"/>
-          </a:graphicData>
-        </a:graphic>
-      </p:graphicFrame>
+        </p:nvPicPr>
+        <p:blipFill>
+          <a:blip r:embed="rId3">
+            <a:extLst>
+              <a:ext uri="{28A0092B-C50C-407E-A947-70E740481C1C}">
+                <a14:useLocalDpi xmlns:a14="http://schemas.microsoft.com/office/drawing/2010/main" val="0"/>
+              </a:ext>
+            </a:extLst>
+          </a:blip>
+          <a:srcRect/>
+          <a:stretch>
+            <a:fillRect/>
+          </a:stretch>
+        </p:blipFill>
+        <p:spPr bwMode="auto">
+          <a:xfrm>
+            <a:off x="1319212" y="1097280"/>
+            <a:ext cx="6505575" cy="5591175"/>
+          </a:xfrm>
+          <a:prstGeom prst="rect">
+            <a:avLst/>
+          </a:prstGeom>
+          <a:noFill/>
+          <a:ln>
+            <a:noFill/>
+          </a:ln>
+          <a:effectLst/>
+          <a:extLst>
+            <a:ext uri="{909E8E84-426E-40DD-AFC4-6F175D3DCCD1}">
+              <a14:hiddenFill xmlns:a14="http://schemas.microsoft.com/office/drawing/2010/main">
+                <a:solidFill>
+                  <a:schemeClr val="accent1"/>
+                </a:solidFill>
+              </a14:hiddenFill>
+            </a:ext>
+            <a:ext uri="{91240B29-F687-4F45-9708-019B960494DF}">
+              <a14:hiddenLine xmlns:a14="http://schemas.microsoft.com/office/drawing/2010/main" w="9525">
+                <a:solidFill>
+                  <a:schemeClr val="tx1"/>
+                </a:solidFill>
+                <a:miter lim="800000"/>
+                <a:headEnd/>
+                <a:tailEnd/>
+              </a14:hiddenLine>
+            </a:ext>
+            <a:ext uri="{AF507438-7753-43E0-B8FC-AC1667EBCBE1}">
+              <a14:hiddenEffects xmlns:a14="http://schemas.microsoft.com/office/drawing/2010/main">
+                <a:effectLst>
+                  <a:outerShdw dist="35921" dir="2700000" algn="ctr" rotWithShape="0">
+                    <a:schemeClr val="bg2"/>
+                  </a:outerShdw>
+                </a:effectLst>
+              </a14:hiddenEffects>
+            </a:ext>
+          </a:extLst>
+        </p:spPr>
+      </p:pic>
     </p:spTree>
+    <p:extLst>
+      <p:ext uri="{BB962C8B-B14F-4D97-AF65-F5344CB8AC3E}">
+        <p14:creationId xmlns:p14="http://schemas.microsoft.com/office/powerpoint/2010/main" val="3198875046"/>
+      </p:ext>
+    </p:extLst>
   </p:cSld>
   <p:clrMapOvr>
     <a:masterClrMapping/>
@@ -7650,7 +8221,7 @@
 </p:sld>
 </file>
 
-<file path=ppt/slides/slide4.xml><?xml version="1.0" encoding="utf-8"?>
+<file path=ppt/slides/slide15.xml><?xml version="1.0" encoding="utf-8"?>
 <p:sld xmlns:a="http://schemas.openxmlformats.org/drawingml/2006/main" xmlns:r="http://schemas.openxmlformats.org/officeDocument/2006/relationships" xmlns:p="http://schemas.openxmlformats.org/presentationml/2006/main">
   <p:cSld>
     <p:spTree>
@@ -7669,7 +8240,7 @@
       </p:grpSpPr>
       <p:sp>
         <p:nvSpPr>
-          <p:cNvPr id="2" name="Заголовок 1"/>
+          <p:cNvPr id="2" name="Title 1"/>
           <p:cNvSpPr>
             <a:spLocks noGrp="1"/>
           </p:cNvSpPr>
@@ -7679,93 +8250,33 @@
         </p:nvSpPr>
         <p:spPr/>
         <p:txBody>
-          <a:bodyPr>
-            <a:normAutofit fontScale="90000"/>
-          </a:bodyPr>
-          <a:lstStyle/>
-          <a:p>
-            <a:r>
-              <a:rPr lang="ru-RU" sz="4900" dirty="0" smtClean="0"/>
-              <a:t>Цели проектирования </a:t>
-            </a:r>
-            <a:r>
-              <a:rPr lang="ru-RU" dirty="0" smtClean="0"/>
-              <a:t>– </a:t>
-            </a:r>
-            <a:r>
-              <a:rPr lang="ru-RU" sz="4000" dirty="0" smtClean="0"/>
-              <a:t>создание ясной и понятной архитектуры</a:t>
-            </a:r>
-            <a:endParaRPr lang="en-US" sz="4000" dirty="0"/>
-          </a:p>
-        </p:txBody>
-      </p:sp>
-      <p:sp>
-        <p:nvSpPr>
-          <p:cNvPr id="3" name="Содержимое 2"/>
-          <p:cNvSpPr>
-            <a:spLocks noGrp="1"/>
-          </p:cNvSpPr>
-          <p:nvPr>
-            <p:ph idx="1"/>
-          </p:nvPr>
-        </p:nvSpPr>
-        <p:spPr/>
-        <p:txBody>
           <a:bodyPr/>
           <a:lstStyle/>
           <a:p>
-            <a:endParaRPr lang="ru-RU" dirty="0" smtClean="0"/>
-          </a:p>
-          <a:p>
             <a:r>
               <a:rPr lang="ru-RU" dirty="0" smtClean="0"/>
-              <a:t>тестирование</a:t>
-            </a:r>
-          </a:p>
-          <a:p>
-            <a:r>
-              <a:rPr lang="ru-RU" dirty="0" smtClean="0"/>
-              <a:t>переносимость </a:t>
-            </a:r>
-          </a:p>
-          <a:p>
-            <a:r>
-              <a:rPr lang="ru-RU" dirty="0" smtClean="0"/>
-              <a:t>поддержка </a:t>
-            </a:r>
-          </a:p>
-          <a:p>
-            <a:r>
-              <a:rPr lang="ru-RU" dirty="0" smtClean="0"/>
-              <a:t>расширение</a:t>
-            </a:r>
-          </a:p>
-          <a:p>
-            <a:r>
-              <a:rPr lang="ru-RU" dirty="0" smtClean="0"/>
-              <a:t>изменение</a:t>
-            </a:r>
-          </a:p>
-          <a:p>
-            <a:r>
-              <a:rPr lang="ru-RU" dirty="0" smtClean="0"/>
-              <a:t>понимание</a:t>
-            </a:r>
-            <a:endParaRPr lang="en-US" dirty="0"/>
+              <a:t>Диаграмма последотельности</a:t>
+            </a:r>
+            <a:endParaRPr lang="ru-RU" dirty="0"/>
           </a:p>
         </p:txBody>
       </p:sp>
       <p:pic>
         <p:nvPicPr>
-          <p:cNvPr id="3074" name="Picture 2" descr="http://www.bigsoft.by/Media/Default/images/qa.gif"/>
+          <p:cNvPr id="2050" name="Picture 2"/>
           <p:cNvPicPr>
             <a:picLocks noChangeAspect="1" noChangeArrowheads="1"/>
           </p:cNvPicPr>
           <p:nvPr/>
         </p:nvPicPr>
         <p:blipFill>
-          <a:blip r:embed="rId2" cstate="print"/>
+          <a:blip r:embed="rId3">
+            <a:extLst>
+              <a:ext uri="{28A0092B-C50C-407E-A947-70E740481C1C}">
+                <a14:useLocalDpi xmlns:a14="http://schemas.microsoft.com/office/drawing/2010/main" val="0"/>
+              </a:ext>
+            </a:extLst>
+          </a:blip>
           <a:srcRect/>
           <a:stretch>
             <a:fillRect/>
@@ -7773,100 +8284,53 @@
         </p:blipFill>
         <p:spPr bwMode="auto">
           <a:xfrm>
-            <a:off x="4344391" y="1752600"/>
-            <a:ext cx="1080168" cy="1066800"/>
+            <a:off x="1728787" y="1209675"/>
+            <a:ext cx="5686425" cy="5648325"/>
           </a:xfrm>
           <a:prstGeom prst="rect">
             <a:avLst/>
           </a:prstGeom>
           <a:noFill/>
-        </p:spPr>
-      </p:pic>
-      <p:pic>
-        <p:nvPicPr>
-          <p:cNvPr id="3078" name="Picture 6" descr="http://s.lurkmore.to/images/8/85/Indian.jpg"/>
-          <p:cNvPicPr>
-            <a:picLocks noChangeAspect="1" noChangeArrowheads="1"/>
-          </p:cNvPicPr>
-          <p:nvPr/>
-        </p:nvPicPr>
-        <p:blipFill>
-          <a:blip r:embed="rId3" cstate="print"/>
-          <a:srcRect/>
-          <a:stretch>
-            <a:fillRect/>
-          </a:stretch>
-        </p:blipFill>
-        <p:spPr bwMode="auto">
-          <a:xfrm>
-            <a:off x="5334000" y="4038600"/>
-            <a:ext cx="1370609" cy="2057400"/>
-          </a:xfrm>
-          <a:prstGeom prst="rect">
-            <a:avLst/>
-          </a:prstGeom>
-          <a:noFill/>
-        </p:spPr>
-      </p:pic>
-      <p:sp>
-        <p:nvSpPr>
-          <p:cNvPr id="8" name="Выноска-облако 7"/>
-          <p:cNvSpPr/>
-          <p:nvPr/>
-        </p:nvSpPr>
-        <p:spPr>
-          <a:xfrm>
-            <a:off x="5791200" y="2590800"/>
-            <a:ext cx="2514600" cy="1143000"/>
-          </a:xfrm>
-          <a:prstGeom prst="cloudCallout">
-            <a:avLst/>
-          </a:prstGeom>
-          <a:noFill/>
           <a:ln>
-            <a:solidFill>
-              <a:schemeClr val="tx1"/>
-            </a:solidFill>
+            <a:noFill/>
           </a:ln>
-        </p:spPr>
-        <p:style>
-          <a:lnRef idx="2">
-            <a:schemeClr val="accent1">
-              <a:shade val="50000"/>
-            </a:schemeClr>
-          </a:lnRef>
-          <a:fillRef idx="1">
-            <a:schemeClr val="accent1"/>
-          </a:fillRef>
-          <a:effectRef idx="0">
-            <a:schemeClr val="accent1"/>
-          </a:effectRef>
-          <a:fontRef idx="minor">
-            <a:schemeClr val="lt1"/>
-          </a:fontRef>
-        </p:style>
-        <p:txBody>
-          <a:bodyPr rtlCol="0" anchor="ctr"/>
-          <a:lstStyle/>
-          <a:p>
-            <a:pPr algn="ctr"/>
-            <a:r>
-              <a:rPr lang="en-US" dirty="0" smtClean="0">
+          <a:effectLst/>
+          <a:extLst>
+            <a:ext uri="{909E8E84-426E-40DD-AFC4-6F175D3DCCD1}">
+              <a14:hiddenFill xmlns:a14="http://schemas.microsoft.com/office/drawing/2010/main">
+                <a:solidFill>
+                  <a:schemeClr val="accent1"/>
+                </a:solidFill>
+              </a14:hiddenFill>
+            </a:ext>
+            <a:ext uri="{91240B29-F687-4F45-9708-019B960494DF}">
+              <a14:hiddenLine xmlns:a14="http://schemas.microsoft.com/office/drawing/2010/main" w="9525">
                 <a:solidFill>
                   <a:schemeClr val="tx1"/>
                 </a:solidFill>
-              </a:rPr>
-              <a:t>why does your code look so unusual?</a:t>
-            </a:r>
-            <a:endParaRPr lang="en-US" dirty="0">
-              <a:solidFill>
-                <a:schemeClr val="tx1"/>
-              </a:solidFill>
-            </a:endParaRPr>
-          </a:p>
-        </p:txBody>
-      </p:sp>
+                <a:miter lim="800000"/>
+                <a:headEnd/>
+                <a:tailEnd/>
+              </a14:hiddenLine>
+            </a:ext>
+            <a:ext uri="{AF507438-7753-43E0-B8FC-AC1667EBCBE1}">
+              <a14:hiddenEffects xmlns:a14="http://schemas.microsoft.com/office/drawing/2010/main">
+                <a:effectLst>
+                  <a:outerShdw dist="35921" dir="2700000" algn="ctr" rotWithShape="0">
+                    <a:schemeClr val="bg2"/>
+                  </a:outerShdw>
+                </a:effectLst>
+              </a14:hiddenEffects>
+            </a:ext>
+          </a:extLst>
+        </p:spPr>
+      </p:pic>
     </p:spTree>
+    <p:extLst>
+      <p:ext uri="{BB962C8B-B14F-4D97-AF65-F5344CB8AC3E}">
+        <p14:creationId xmlns:p14="http://schemas.microsoft.com/office/powerpoint/2010/main" val="1090394184"/>
+      </p:ext>
+    </p:extLst>
   </p:cSld>
   <p:clrMapOvr>
     <a:masterClrMapping/>
@@ -7881,7 +8345,7 @@
 </p:sld>
 </file>
 
-<file path=ppt/slides/slide5.xml><?xml version="1.0" encoding="utf-8"?>
+<file path=ppt/slides/slide16.xml><?xml version="1.0" encoding="utf-8"?>
 <p:sld xmlns:a="http://schemas.openxmlformats.org/drawingml/2006/main" xmlns:r="http://schemas.openxmlformats.org/officeDocument/2006/relationships" xmlns:p="http://schemas.openxmlformats.org/presentationml/2006/main">
   <p:cSld>
     <p:spTree>
@@ -7900,157 +8364,13 @@
       </p:grpSpPr>
       <p:sp>
         <p:nvSpPr>
-          <p:cNvPr id="2" name="Заголовок 1"/>
-          <p:cNvSpPr>
-            <a:spLocks noGrp="1"/>
-          </p:cNvSpPr>
-          <p:nvPr>
-            <p:ph type="title"/>
-          </p:nvPr>
-        </p:nvSpPr>
-        <p:spPr/>
-        <p:txBody>
-          <a:bodyPr/>
-          <a:lstStyle/>
-          <a:p>
-            <a:r>
-              <a:rPr lang="ru-RU" dirty="0" smtClean="0"/>
-              <a:t>Языки моделирования</a:t>
-            </a:r>
-            <a:endParaRPr lang="en-US" dirty="0"/>
-          </a:p>
-        </p:txBody>
-      </p:sp>
-      <p:sp>
-        <p:nvSpPr>
-          <p:cNvPr id="3" name="Содержимое 2"/>
-          <p:cNvSpPr>
-            <a:spLocks noGrp="1"/>
-          </p:cNvSpPr>
-          <p:nvPr>
-            <p:ph idx="1"/>
-          </p:nvPr>
-        </p:nvSpPr>
-        <p:spPr/>
-        <p:txBody>
-          <a:bodyPr/>
-          <a:lstStyle/>
-          <a:p>
-            <a:r>
-              <a:rPr lang="en-US" b="1" dirty="0" smtClean="0"/>
-              <a:t>UML</a:t>
-            </a:r>
-            <a:r>
-              <a:rPr lang="en-US" dirty="0" smtClean="0"/>
-              <a:t> - </a:t>
-            </a:r>
-            <a:r>
-              <a:rPr lang="en-US" i="1" dirty="0"/>
-              <a:t>Unified Modeling </a:t>
-            </a:r>
-            <a:r>
-              <a:rPr lang="en-US" i="1" dirty="0" smtClean="0"/>
-              <a:t>Language</a:t>
-            </a:r>
-          </a:p>
-          <a:p>
-            <a:r>
-              <a:rPr lang="ru-RU" b="1" dirty="0" err="1" smtClean="0"/>
-              <a:t>SysML</a:t>
-            </a:r>
-            <a:r>
-              <a:rPr lang="en-US" dirty="0" smtClean="0"/>
-              <a:t> - </a:t>
-            </a:r>
-            <a:r>
-              <a:rPr lang="en-US" i="1" dirty="0"/>
-              <a:t>The Systems Modeling </a:t>
-            </a:r>
-            <a:r>
-              <a:rPr lang="en-US" i="1" dirty="0" smtClean="0"/>
-              <a:t>Language</a:t>
-            </a:r>
-          </a:p>
-          <a:p>
-            <a:r>
-              <a:rPr lang="ru-RU" b="1" dirty="0" smtClean="0"/>
-              <a:t>IDEF</a:t>
-            </a:r>
-            <a:r>
-              <a:rPr lang="en-US" dirty="0" smtClean="0"/>
-              <a:t> - </a:t>
-            </a:r>
-            <a:r>
-              <a:rPr lang="en-US" i="1" dirty="0"/>
-              <a:t>Integrated Computer-Aided </a:t>
-            </a:r>
-            <a:r>
-              <a:rPr lang="en-US" i="1" dirty="0" smtClean="0"/>
-              <a:t>Manufacturing</a:t>
-            </a:r>
-          </a:p>
-          <a:p>
-            <a:r>
-              <a:rPr lang="en-US" b="1" dirty="0" smtClean="0"/>
-              <a:t>DFD</a:t>
-            </a:r>
-            <a:r>
-              <a:rPr lang="en-US" dirty="0" smtClean="0"/>
-              <a:t> - </a:t>
-            </a:r>
-            <a:r>
-              <a:rPr lang="en-US" dirty="0"/>
-              <a:t> </a:t>
-            </a:r>
-            <a:r>
-              <a:rPr lang="en-US" i="1" dirty="0"/>
-              <a:t>Data Flow Diagrams</a:t>
-            </a:r>
-            <a:endParaRPr lang="ru-RU" dirty="0"/>
-          </a:p>
-        </p:txBody>
-      </p:sp>
-    </p:spTree>
-  </p:cSld>
-  <p:clrMapOvr>
-    <a:masterClrMapping/>
-  </p:clrMapOvr>
-  <p:timing>
-    <p:tnLst>
-      <p:par>
-        <p:cTn id="1" dur="indefinite" restart="never" nodeType="tmRoot"/>
-      </p:par>
-    </p:tnLst>
-  </p:timing>
-</p:sld>
-</file>
-
-<file path=ppt/slides/slide6.xml><?xml version="1.0" encoding="utf-8"?>
-<p:sld xmlns:a="http://schemas.openxmlformats.org/drawingml/2006/main" xmlns:r="http://schemas.openxmlformats.org/officeDocument/2006/relationships" xmlns:p="http://schemas.openxmlformats.org/presentationml/2006/main">
-  <p:cSld>
-    <p:spTree>
-      <p:nvGrpSpPr>
-        <p:cNvPr id="1" name=""/>
-        <p:cNvGrpSpPr/>
-        <p:nvPr/>
-      </p:nvGrpSpPr>
-      <p:grpSpPr>
-        <a:xfrm>
-          <a:off x="0" y="0"/>
-          <a:ext cx="0" cy="0"/>
-          <a:chOff x="0" y="0"/>
-          <a:chExt cx="0" cy="0"/>
-        </a:xfrm>
-      </p:grpSpPr>
-      <p:sp>
-        <p:nvSpPr>
-          <p:cNvPr id="7" name="Стрелка влево 6"/>
+          <p:cNvPr id="31" name="Стрелка влево 17"/>
           <p:cNvSpPr/>
           <p:nvPr/>
         </p:nvSpPr>
         <p:spPr>
-          <a:xfrm rot="19682471">
-            <a:off x="2564914" y="1422884"/>
+          <a:xfrm rot="18690202">
+            <a:off x="5888849" y="3401354"/>
             <a:ext cx="1330820" cy="656722"/>
           </a:xfrm>
           <a:prstGeom prst="leftArrow">
@@ -8095,13 +8415,13 @@
       </p:sp>
       <p:sp>
         <p:nvSpPr>
-          <p:cNvPr id="16" name="Стрелка влево 15"/>
+          <p:cNvPr id="32" name="Стрелка влево 18"/>
           <p:cNvSpPr/>
           <p:nvPr/>
         </p:nvSpPr>
         <p:spPr>
-          <a:xfrm rot="12528010">
-            <a:off x="5238210" y="1415582"/>
+          <a:xfrm rot="13519859">
+            <a:off x="6590163" y="3395035"/>
             <a:ext cx="1330820" cy="656722"/>
           </a:xfrm>
           <a:prstGeom prst="leftArrow">
@@ -8146,13 +8466,13 @@
       </p:sp>
       <p:sp>
         <p:nvSpPr>
-          <p:cNvPr id="17" name="Стрелка влево 16"/>
+          <p:cNvPr id="29" name="Стрелка влево 17"/>
           <p:cNvSpPr/>
           <p:nvPr/>
         </p:nvSpPr>
         <p:spPr>
-          <a:xfrm rot="16200000">
-            <a:off x="3883029" y="2470649"/>
+          <a:xfrm rot="18690202">
+            <a:off x="1056162" y="3451509"/>
             <a:ext cx="1330820" cy="656722"/>
           </a:xfrm>
           <a:prstGeom prst="leftArrow">
@@ -8197,13 +8517,13 @@
       </p:sp>
       <p:sp>
         <p:nvSpPr>
-          <p:cNvPr id="18" name="Стрелка влево 17"/>
+          <p:cNvPr id="30" name="Стрелка влево 18"/>
           <p:cNvSpPr/>
           <p:nvPr/>
         </p:nvSpPr>
         <p:spPr>
-          <a:xfrm rot="18690202">
-            <a:off x="3069449" y="4502369"/>
+          <a:xfrm rot="13519859">
+            <a:off x="1757476" y="3445190"/>
             <a:ext cx="1330820" cy="656722"/>
           </a:xfrm>
           <a:prstGeom prst="leftArrow">
@@ -8248,13 +8568,13 @@
       </p:sp>
       <p:sp>
         <p:nvSpPr>
-          <p:cNvPr id="19" name="Стрелка влево 18"/>
+          <p:cNvPr id="7" name="Стрелка влево 6"/>
           <p:cNvSpPr/>
           <p:nvPr/>
         </p:nvSpPr>
         <p:spPr>
-          <a:xfrm rot="13519859">
-            <a:off x="4558360" y="4506069"/>
+          <a:xfrm rot="19682471">
+            <a:off x="2959849" y="2209618"/>
             <a:ext cx="1330820" cy="656722"/>
           </a:xfrm>
           <a:prstGeom prst="leftArrow">
@@ -8297,6 +8617,57 @@
           </a:fontRef>
         </p:style>
       </p:sp>
+      <p:sp>
+        <p:nvSpPr>
+          <p:cNvPr id="16" name="Стрелка влево 15"/>
+          <p:cNvSpPr/>
+          <p:nvPr/>
+        </p:nvSpPr>
+        <p:spPr>
+          <a:xfrm rot="12528010">
+            <a:off x="4520416" y="2268809"/>
+            <a:ext cx="1330820" cy="656722"/>
+          </a:xfrm>
+          <a:prstGeom prst="leftArrow">
+            <a:avLst>
+              <a:gd name="adj1" fmla="val 60000"/>
+              <a:gd name="adj2" fmla="val 50000"/>
+            </a:avLst>
+          </a:prstGeom>
+        </p:spPr>
+        <p:style>
+          <a:lnRef idx="0">
+            <a:schemeClr val="accent1">
+              <a:tint val="60000"/>
+              <a:hueOff val="0"/>
+              <a:satOff val="0"/>
+              <a:lumOff val="0"/>
+              <a:alphaOff val="0"/>
+            </a:schemeClr>
+          </a:lnRef>
+          <a:fillRef idx="1">
+            <a:schemeClr val="accent1">
+              <a:tint val="60000"/>
+              <a:hueOff val="0"/>
+              <a:satOff val="0"/>
+              <a:lumOff val="0"/>
+              <a:alphaOff val="0"/>
+            </a:schemeClr>
+          </a:fillRef>
+          <a:effectRef idx="0">
+            <a:schemeClr val="accent1">
+              <a:tint val="60000"/>
+              <a:hueOff val="0"/>
+              <a:satOff val="0"/>
+              <a:lumOff val="0"/>
+              <a:alphaOff val="0"/>
+            </a:schemeClr>
+          </a:effectRef>
+          <a:fontRef idx="minor">
+            <a:schemeClr val="lt1"/>
+          </a:fontRef>
+        </p:style>
+      </p:sp>
       <p:grpSp>
         <p:nvGrpSpPr>
           <p:cNvPr id="20" name="Группа 19"/>
@@ -8305,7 +8676,7 @@
         </p:nvGrpSpPr>
         <p:grpSpPr>
           <a:xfrm>
-            <a:off x="533400" y="1600200"/>
+            <a:off x="1141394" y="2592293"/>
             <a:ext cx="1768311" cy="1197738"/>
             <a:chOff x="6012539" y="1542963"/>
             <a:chExt cx="1768311" cy="1197738"/>
@@ -8410,10 +8781,31 @@
                 </a:spcAft>
               </a:pPr>
               <a:r>
-                <a:rPr lang="ru-RU" sz="1600" b="1" kern="1200" dirty="0" err="1" smtClean="0"/>
-                <a:t>Эскизирование</a:t>
+                <a:rPr lang="ru-RU" sz="2400" b="1" kern="1200" dirty="0" smtClean="0"/>
+                <a:t>Водопад</a:t>
               </a:r>
-              <a:endParaRPr lang="en-US" sz="1600" b="1" kern="1200" dirty="0"/>
+            </a:p>
+            <a:p>
+              <a:pPr lvl="0" algn="ctr" defTabSz="711200">
+                <a:lnSpc>
+                  <a:spcPct val="90000"/>
+                </a:lnSpc>
+                <a:spcBef>
+                  <a:spcPct val="0"/>
+                </a:spcBef>
+                <a:spcAft>
+                  <a:spcPct val="35000"/>
+                </a:spcAft>
+              </a:pPr>
+              <a:r>
+                <a:rPr lang="ru-RU" sz="2400" b="1" dirty="0" smtClean="0"/>
+                <a:t>(</a:t>
+              </a:r>
+              <a:r>
+                <a:rPr lang="en-US" sz="2400" b="1" dirty="0" smtClean="0"/>
+                <a:t>waterfall)</a:t>
+              </a:r>
+              <a:endParaRPr lang="en-US" sz="2400" b="1" kern="1200" dirty="0"/>
             </a:p>
           </p:txBody>
         </p:sp>
@@ -8426,7 +8818,7 @@
         </p:nvGrpSpPr>
         <p:grpSpPr>
           <a:xfrm>
-            <a:off x="6705600" y="1524000"/>
+            <a:off x="5958477" y="2514600"/>
             <a:ext cx="1905000" cy="1295400"/>
             <a:chOff x="6012539" y="1542963"/>
             <a:chExt cx="1768311" cy="1197738"/>
@@ -8531,10 +8923,1668 @@
                 </a:spcAft>
               </a:pPr>
               <a:r>
-                <a:rPr lang="ru-RU" sz="1500" b="1" kern="1200" dirty="0" smtClean="0"/>
+                <a:rPr lang="ru-RU" sz="2400" b="1" dirty="0" smtClean="0"/>
+                <a:t>Итеративные</a:t>
+              </a:r>
+              <a:endParaRPr lang="en-US" sz="2400" b="1" kern="1200" dirty="0"/>
+            </a:p>
+          </p:txBody>
+        </p:sp>
+      </p:grpSp>
+      <p:sp>
+        <p:nvSpPr>
+          <p:cNvPr id="14" name="Овал 13"/>
+          <p:cNvSpPr/>
+          <p:nvPr/>
+        </p:nvSpPr>
+        <p:spPr>
+          <a:xfrm>
+            <a:off x="2781300" y="508862"/>
+            <a:ext cx="3326466" cy="1985167"/>
+          </a:xfrm>
+          <a:prstGeom prst="ellipse">
+            <a:avLst/>
+          </a:prstGeom>
+          <a:solidFill>
+            <a:srgbClr val="00B0F0"/>
+          </a:solidFill>
+        </p:spPr>
+        <p:style>
+          <a:lnRef idx="2">
+            <a:schemeClr val="lt1">
+              <a:hueOff val="0"/>
+              <a:satOff val="0"/>
+              <a:lumOff val="0"/>
+              <a:alphaOff val="0"/>
+            </a:schemeClr>
+          </a:lnRef>
+          <a:fillRef idx="1">
+            <a:schemeClr val="accent1">
+              <a:hueOff val="0"/>
+              <a:satOff val="0"/>
+              <a:lumOff val="0"/>
+              <a:alphaOff val="0"/>
+            </a:schemeClr>
+          </a:fillRef>
+          <a:effectRef idx="0">
+            <a:schemeClr val="accent1">
+              <a:hueOff val="0"/>
+              <a:satOff val="0"/>
+              <a:lumOff val="0"/>
+              <a:alphaOff val="0"/>
+            </a:schemeClr>
+          </a:effectRef>
+          <a:fontRef idx="minor">
+            <a:schemeClr val="lt1"/>
+          </a:fontRef>
+        </p:style>
+        <p:txBody>
+          <a:bodyPr/>
+          <a:lstStyle/>
+          <a:p>
+            <a:pPr algn="ctr">
+              <a:lnSpc>
+                <a:spcPct val="150000"/>
+              </a:lnSpc>
+            </a:pPr>
+            <a:r>
+              <a:rPr lang="ru-RU" sz="2400" dirty="0" smtClean="0"/>
+              <a:t>Процесс разработки</a:t>
+            </a:r>
+            <a:endParaRPr lang="en-US" sz="2400" dirty="0"/>
+          </a:p>
+        </p:txBody>
+      </p:sp>
+      <p:sp>
+        <p:nvSpPr>
+          <p:cNvPr id="33" name="Скругленный прямоугольник 4"/>
+          <p:cNvSpPr/>
+          <p:nvPr/>
+        </p:nvSpPr>
+        <p:spPr>
+          <a:xfrm>
+            <a:off x="152400" y="4427464"/>
+            <a:ext cx="1535933" cy="754136"/>
+          </a:xfrm>
+          <a:prstGeom prst="rect">
+            <a:avLst/>
+          </a:prstGeom>
+          <a:solidFill>
+            <a:srgbClr val="92D050"/>
+          </a:solidFill>
+        </p:spPr>
+        <p:style>
+          <a:lnRef idx="0">
+            <a:scrgbClr r="0" g="0" b="0"/>
+          </a:lnRef>
+          <a:fillRef idx="0">
+            <a:scrgbClr r="0" g="0" b="0"/>
+          </a:fillRef>
+          <a:effectRef idx="0">
+            <a:scrgbClr r="0" g="0" b="0"/>
+          </a:effectRef>
+          <a:fontRef idx="minor">
+            <a:schemeClr val="lt1"/>
+          </a:fontRef>
+        </p:style>
+        <p:txBody>
+          <a:bodyPr spcFirstLastPara="0" vert="horz" wrap="square" lIns="30480" tIns="30480" rIns="30480" bIns="30480" numCol="1" spcCol="1270" anchor="ctr" anchorCtr="0">
+            <a:noAutofit/>
+          </a:bodyPr>
+          <a:lstStyle/>
+          <a:p>
+            <a:pPr lvl="0" algn="ctr" defTabSz="711200">
+              <a:lnSpc>
+                <a:spcPct val="90000"/>
+              </a:lnSpc>
+              <a:spcBef>
+                <a:spcPct val="0"/>
+              </a:spcBef>
+              <a:spcAft>
+                <a:spcPct val="35000"/>
+              </a:spcAft>
+            </a:pPr>
+            <a:r>
+              <a:rPr lang="ru-RU" sz="1600" b="1" dirty="0" smtClean="0"/>
+              <a:t>Прогнозное планирование</a:t>
+            </a:r>
+            <a:endParaRPr lang="en-US" sz="1600" b="1" kern="1200" dirty="0"/>
+          </a:p>
+        </p:txBody>
+      </p:sp>
+      <p:sp>
+        <p:nvSpPr>
+          <p:cNvPr id="34" name="Скругленный прямоугольник 4"/>
+          <p:cNvSpPr/>
+          <p:nvPr/>
+        </p:nvSpPr>
+        <p:spPr>
+          <a:xfrm>
+            <a:off x="2590800" y="4415165"/>
+            <a:ext cx="1535933" cy="754136"/>
+          </a:xfrm>
+          <a:prstGeom prst="rect">
+            <a:avLst/>
+          </a:prstGeom>
+          <a:solidFill>
+            <a:srgbClr val="92D050"/>
+          </a:solidFill>
+        </p:spPr>
+        <p:style>
+          <a:lnRef idx="0">
+            <a:scrgbClr r="0" g="0" b="0"/>
+          </a:lnRef>
+          <a:fillRef idx="0">
+            <a:scrgbClr r="0" g="0" b="0"/>
+          </a:fillRef>
+          <a:effectRef idx="0">
+            <a:scrgbClr r="0" g="0" b="0"/>
+          </a:effectRef>
+          <a:fontRef idx="minor">
+            <a:schemeClr val="lt1"/>
+          </a:fontRef>
+        </p:style>
+        <p:txBody>
+          <a:bodyPr spcFirstLastPara="0" vert="horz" wrap="square" lIns="30480" tIns="30480" rIns="30480" bIns="30480" numCol="1" spcCol="1270" anchor="ctr" anchorCtr="0">
+            <a:noAutofit/>
+          </a:bodyPr>
+          <a:lstStyle/>
+          <a:p>
+            <a:pPr lvl="0" algn="ctr" defTabSz="711200">
+              <a:lnSpc>
+                <a:spcPct val="90000"/>
+              </a:lnSpc>
+              <a:spcBef>
+                <a:spcPct val="0"/>
+              </a:spcBef>
+              <a:spcAft>
+                <a:spcPct val="35000"/>
+              </a:spcAft>
+            </a:pPr>
+            <a:r>
+              <a:rPr lang="ru-RU" sz="1600" b="1" dirty="0" smtClean="0"/>
+              <a:t>Прогнозное планирование</a:t>
+            </a:r>
+            <a:endParaRPr lang="en-US" sz="1600" b="1" kern="1200" dirty="0"/>
+          </a:p>
+        </p:txBody>
+      </p:sp>
+      <p:sp>
+        <p:nvSpPr>
+          <p:cNvPr id="38" name="Скругленный прямоугольник 4"/>
+          <p:cNvSpPr/>
+          <p:nvPr/>
+        </p:nvSpPr>
+        <p:spPr>
+          <a:xfrm>
+            <a:off x="4941067" y="4427464"/>
+            <a:ext cx="1535933" cy="754136"/>
+          </a:xfrm>
+          <a:prstGeom prst="rect">
+            <a:avLst/>
+          </a:prstGeom>
+          <a:solidFill>
+            <a:srgbClr val="92D050"/>
+          </a:solidFill>
+        </p:spPr>
+        <p:style>
+          <a:lnRef idx="0">
+            <a:scrgbClr r="0" g="0" b="0"/>
+          </a:lnRef>
+          <a:fillRef idx="0">
+            <a:scrgbClr r="0" g="0" b="0"/>
+          </a:fillRef>
+          <a:effectRef idx="0">
+            <a:scrgbClr r="0" g="0" b="0"/>
+          </a:effectRef>
+          <a:fontRef idx="minor">
+            <a:schemeClr val="lt1"/>
+          </a:fontRef>
+        </p:style>
+        <p:txBody>
+          <a:bodyPr spcFirstLastPara="0" vert="horz" wrap="square" lIns="30480" tIns="30480" rIns="30480" bIns="30480" numCol="1" spcCol="1270" anchor="ctr" anchorCtr="0">
+            <a:noAutofit/>
+          </a:bodyPr>
+          <a:lstStyle/>
+          <a:p>
+            <a:pPr lvl="0" algn="ctr" defTabSz="711200">
+              <a:lnSpc>
+                <a:spcPct val="90000"/>
+              </a:lnSpc>
+              <a:spcBef>
+                <a:spcPct val="0"/>
+              </a:spcBef>
+              <a:spcAft>
+                <a:spcPct val="35000"/>
+              </a:spcAft>
+            </a:pPr>
+            <a:r>
+              <a:rPr lang="ru-RU" sz="1600" b="1" kern="1200" dirty="0" smtClean="0"/>
+              <a:t>Функционал</a:t>
+            </a:r>
+            <a:endParaRPr lang="en-US" sz="1600" b="1" kern="1200" dirty="0"/>
+          </a:p>
+        </p:txBody>
+      </p:sp>
+      <p:sp>
+        <p:nvSpPr>
+          <p:cNvPr id="39" name="Скругленный прямоугольник 4"/>
+          <p:cNvSpPr/>
+          <p:nvPr/>
+        </p:nvSpPr>
+        <p:spPr>
+          <a:xfrm>
+            <a:off x="7379467" y="4415165"/>
+            <a:ext cx="1535933" cy="754136"/>
+          </a:xfrm>
+          <a:prstGeom prst="rect">
+            <a:avLst/>
+          </a:prstGeom>
+          <a:solidFill>
+            <a:srgbClr val="92D050"/>
+          </a:solidFill>
+        </p:spPr>
+        <p:style>
+          <a:lnRef idx="0">
+            <a:scrgbClr r="0" g="0" b="0"/>
+          </a:lnRef>
+          <a:fillRef idx="0">
+            <a:scrgbClr r="0" g="0" b="0"/>
+          </a:fillRef>
+          <a:effectRef idx="0">
+            <a:scrgbClr r="0" g="0" b="0"/>
+          </a:effectRef>
+          <a:fontRef idx="minor">
+            <a:schemeClr val="lt1"/>
+          </a:fontRef>
+        </p:style>
+        <p:txBody>
+          <a:bodyPr spcFirstLastPara="0" vert="horz" wrap="square" lIns="30480" tIns="30480" rIns="30480" bIns="30480" numCol="1" spcCol="1270" anchor="ctr" anchorCtr="0">
+            <a:noAutofit/>
+          </a:bodyPr>
+          <a:lstStyle/>
+          <a:p>
+            <a:pPr lvl="0" algn="ctr" defTabSz="711200">
+              <a:lnSpc>
+                <a:spcPct val="90000"/>
+              </a:lnSpc>
+              <a:spcBef>
+                <a:spcPct val="0"/>
+              </a:spcBef>
+              <a:spcAft>
+                <a:spcPct val="35000"/>
+              </a:spcAft>
+            </a:pPr>
+            <a:r>
+              <a:rPr lang="ru-RU" sz="1600" b="1" dirty="0" smtClean="0"/>
+              <a:t>Упаковка по времени</a:t>
+            </a:r>
+            <a:endParaRPr lang="en-US" sz="1600" b="1" kern="1200" dirty="0"/>
+          </a:p>
+        </p:txBody>
+      </p:sp>
+    </p:spTree>
+    <p:extLst>
+      <p:ext uri="{BB962C8B-B14F-4D97-AF65-F5344CB8AC3E}">
+        <p14:creationId xmlns:p14="http://schemas.microsoft.com/office/powerpoint/2010/main" val="45922371"/>
+      </p:ext>
+    </p:extLst>
+  </p:cSld>
+  <p:clrMapOvr>
+    <a:masterClrMapping/>
+  </p:clrMapOvr>
+  <p:timing>
+    <p:tnLst>
+      <p:par>
+        <p:cTn id="1" dur="indefinite" restart="never" nodeType="tmRoot"/>
+      </p:par>
+    </p:tnLst>
+  </p:timing>
+</p:sld>
+</file>
+
+<file path=ppt/slides/slide17.xml><?xml version="1.0" encoding="utf-8"?>
+<p:sld xmlns:a="http://schemas.openxmlformats.org/drawingml/2006/main" xmlns:r="http://schemas.openxmlformats.org/officeDocument/2006/relationships" xmlns:p="http://schemas.openxmlformats.org/presentationml/2006/main">
+  <p:cSld>
+    <p:spTree>
+      <p:nvGrpSpPr>
+        <p:cNvPr id="1" name=""/>
+        <p:cNvGrpSpPr/>
+        <p:nvPr/>
+      </p:nvGrpSpPr>
+      <p:grpSpPr>
+        <a:xfrm>
+          <a:off x="0" y="0"/>
+          <a:ext cx="0" cy="0"/>
+          <a:chOff x="0" y="0"/>
+          <a:chExt cx="0" cy="0"/>
+        </a:xfrm>
+      </p:grpSpPr>
+      <p:sp>
+        <p:nvSpPr>
+          <p:cNvPr id="4" name="TextBox 3"/>
+          <p:cNvSpPr txBox="1"/>
+          <p:nvPr/>
+        </p:nvSpPr>
+        <p:spPr>
+          <a:xfrm>
+            <a:off x="5029200" y="2438400"/>
+            <a:ext cx="720069" cy="1477328"/>
+          </a:xfrm>
+          <a:prstGeom prst="rect">
+            <a:avLst/>
+          </a:prstGeom>
+          <a:noFill/>
+        </p:spPr>
+        <p:txBody>
+          <a:bodyPr wrap="none" rtlCol="0">
+            <a:spAutoFit/>
+          </a:bodyPr>
+          <a:lstStyle/>
+          <a:p>
+            <a:r>
+              <a:rPr lang="ru-RU" sz="9000" dirty="0"/>
+              <a:t>?</a:t>
+            </a:r>
+          </a:p>
+        </p:txBody>
+      </p:sp>
+    </p:spTree>
+    <p:extLst>
+      <p:ext uri="{BB962C8B-B14F-4D97-AF65-F5344CB8AC3E}">
+        <p14:creationId xmlns:p14="http://schemas.microsoft.com/office/powerpoint/2010/main" val="4262273795"/>
+      </p:ext>
+    </p:extLst>
+  </p:cSld>
+  <p:clrMapOvr>
+    <a:masterClrMapping/>
+  </p:clrMapOvr>
+  <p:timing>
+    <p:tnLst>
+      <p:par>
+        <p:cTn id="1" dur="indefinite" restart="never" nodeType="tmRoot"/>
+      </p:par>
+    </p:tnLst>
+  </p:timing>
+</p:sld>
+</file>
+
+<file path=ppt/slides/slide18.xml><?xml version="1.0" encoding="utf-8"?>
+<p:sld xmlns:a="http://schemas.openxmlformats.org/drawingml/2006/main" xmlns:r="http://schemas.openxmlformats.org/officeDocument/2006/relationships" xmlns:p="http://schemas.openxmlformats.org/presentationml/2006/main">
+  <p:cSld>
+    <p:spTree>
+      <p:nvGrpSpPr>
+        <p:cNvPr id="1" name=""/>
+        <p:cNvGrpSpPr/>
+        <p:nvPr/>
+      </p:nvGrpSpPr>
+      <p:grpSpPr>
+        <a:xfrm>
+          <a:off x="0" y="0"/>
+          <a:ext cx="0" cy="0"/>
+          <a:chOff x="0" y="0"/>
+          <a:chExt cx="0" cy="0"/>
+        </a:xfrm>
+      </p:grpSpPr>
+      <p:sp>
+        <p:nvSpPr>
+          <p:cNvPr id="2" name="Title 1"/>
+          <p:cNvSpPr>
+            <a:spLocks noGrp="1"/>
+          </p:cNvSpPr>
+          <p:nvPr>
+            <p:ph type="title"/>
+          </p:nvPr>
+        </p:nvSpPr>
+        <p:spPr/>
+        <p:txBody>
+          <a:bodyPr/>
+          <a:lstStyle/>
+          <a:p>
+            <a:r>
+              <a:rPr lang="en-US" dirty="0" err="1" smtClean="0"/>
+              <a:t>CMake</a:t>
+            </a:r>
+            <a:r>
+              <a:rPr lang="en-US" dirty="0" smtClean="0"/>
+              <a:t> Finder</a:t>
+            </a:r>
+            <a:endParaRPr lang="ru-RU" dirty="0"/>
+          </a:p>
+        </p:txBody>
+      </p:sp>
+      <p:sp>
+        <p:nvSpPr>
+          <p:cNvPr id="3" name="Content Placeholder 2"/>
+          <p:cNvSpPr>
+            <a:spLocks noGrp="1"/>
+          </p:cNvSpPr>
+          <p:nvPr>
+            <p:ph idx="1"/>
+          </p:nvPr>
+        </p:nvSpPr>
+        <p:spPr/>
+        <p:txBody>
+          <a:bodyPr/>
+          <a:lstStyle/>
+          <a:p>
+            <a:r>
+              <a:rPr lang="en-US" dirty="0" smtClean="0"/>
+              <a:t>Find&lt;module name&gt;.</a:t>
+            </a:r>
+            <a:r>
+              <a:rPr lang="en-US" dirty="0" err="1" smtClean="0"/>
+              <a:t>cmake</a:t>
+            </a:r>
+            <a:endParaRPr lang="en-US" dirty="0" smtClean="0"/>
+          </a:p>
+          <a:p>
+            <a:pPr lvl="1"/>
+            <a:r>
+              <a:rPr lang="en-US" dirty="0" err="1" smtClean="0"/>
+              <a:t>FindBoost.cmake</a:t>
+            </a:r>
+            <a:r>
+              <a:rPr lang="en-US" dirty="0" smtClean="0"/>
+              <a:t> – Boost finder</a:t>
+            </a:r>
+          </a:p>
+          <a:p>
+            <a:pPr lvl="1"/>
+            <a:endParaRPr lang="en-US" dirty="0" smtClean="0"/>
+          </a:p>
+          <a:p>
+            <a:r>
+              <a:rPr lang="en-US" dirty="0" smtClean="0"/>
+              <a:t>Examples:</a:t>
+            </a:r>
+          </a:p>
+          <a:p>
+            <a:pPr marL="0" indent="0">
+              <a:buNone/>
+            </a:pPr>
+            <a:r>
+              <a:rPr lang="en-US" sz="3000" b="1" dirty="0" smtClean="0"/>
+              <a:t>%</a:t>
+            </a:r>
+            <a:r>
+              <a:rPr lang="en-US" sz="3000" b="1" dirty="0" err="1" smtClean="0"/>
+              <a:t>Cmake-x.x</a:t>
+            </a:r>
+            <a:r>
+              <a:rPr lang="en-US" sz="3000" b="1" dirty="0" smtClean="0"/>
+              <a:t> directory%/share/</a:t>
+            </a:r>
+            <a:r>
+              <a:rPr lang="en-US" sz="3000" b="1" dirty="0" err="1" smtClean="0"/>
+              <a:t>cmake-x.x</a:t>
+            </a:r>
+            <a:r>
+              <a:rPr lang="en-US" sz="3000" b="1" dirty="0" smtClean="0"/>
+              <a:t>/Modules</a:t>
+            </a:r>
+          </a:p>
+          <a:p>
+            <a:pPr marL="0" indent="0">
+              <a:buNone/>
+            </a:pPr>
+            <a:r>
+              <a:rPr lang="en-US" sz="3000" b="1" dirty="0" err="1" smtClean="0"/>
+              <a:t>Findsystem_utilities.cmake</a:t>
+            </a:r>
+            <a:endParaRPr lang="ru-RU" sz="3000" b="1" dirty="0"/>
+          </a:p>
+        </p:txBody>
+      </p:sp>
+      <p:sp>
+        <p:nvSpPr>
+          <p:cNvPr id="4" name="Rectangle 3"/>
+          <p:cNvSpPr/>
+          <p:nvPr/>
+        </p:nvSpPr>
+        <p:spPr>
+          <a:xfrm>
+            <a:off x="1371600" y="6400800"/>
+            <a:ext cx="7620000" cy="369332"/>
+          </a:xfrm>
+          <a:prstGeom prst="rect">
+            <a:avLst/>
+          </a:prstGeom>
+        </p:spPr>
+        <p:txBody>
+          <a:bodyPr wrap="square">
+            <a:spAutoFit/>
+          </a:bodyPr>
+          <a:lstStyle/>
+          <a:p>
+            <a:pPr algn="r"/>
+            <a:r>
+              <a:rPr lang="en-US" dirty="0">
+                <a:hlinkClick r:id="rId2"/>
+              </a:rPr>
+              <a:t>http://www.cmake.org/cmake/help/ctest2.6docs.html#command:find_package</a:t>
+            </a:r>
+            <a:endParaRPr lang="ru-RU" dirty="0"/>
+          </a:p>
+        </p:txBody>
+      </p:sp>
+      <p:cxnSp>
+        <p:nvCxnSpPr>
+          <p:cNvPr id="5" name="Прямая соединительная линия 6"/>
+          <p:cNvCxnSpPr/>
+          <p:nvPr/>
+        </p:nvCxnSpPr>
+        <p:spPr>
+          <a:xfrm>
+            <a:off x="3657600" y="6400800"/>
+            <a:ext cx="5181600" cy="0"/>
+          </a:xfrm>
+          <a:prstGeom prst="line">
+            <a:avLst/>
+          </a:prstGeom>
+        </p:spPr>
+        <p:style>
+          <a:lnRef idx="1">
+            <a:schemeClr val="accent1"/>
+          </a:lnRef>
+          <a:fillRef idx="0">
+            <a:schemeClr val="accent1"/>
+          </a:fillRef>
+          <a:effectRef idx="0">
+            <a:schemeClr val="accent1"/>
+          </a:effectRef>
+          <a:fontRef idx="minor">
+            <a:schemeClr val="tx1"/>
+          </a:fontRef>
+        </p:style>
+      </p:cxnSp>
+    </p:spTree>
+    <p:extLst>
+      <p:ext uri="{BB962C8B-B14F-4D97-AF65-F5344CB8AC3E}">
+        <p14:creationId xmlns:p14="http://schemas.microsoft.com/office/powerpoint/2010/main" val="1808041298"/>
+      </p:ext>
+    </p:extLst>
+  </p:cSld>
+  <p:clrMapOvr>
+    <a:masterClrMapping/>
+  </p:clrMapOvr>
+  <p:timing>
+    <p:tnLst>
+      <p:par>
+        <p:cTn id="1" dur="indefinite" restart="never" nodeType="tmRoot"/>
+      </p:par>
+    </p:tnLst>
+  </p:timing>
+</p:sld>
+</file>
+
+<file path=ppt/slides/slide2.xml><?xml version="1.0" encoding="utf-8"?>
+<p:sld xmlns:a="http://schemas.openxmlformats.org/drawingml/2006/main" xmlns:r="http://schemas.openxmlformats.org/officeDocument/2006/relationships" xmlns:p="http://schemas.openxmlformats.org/presentationml/2006/main">
+  <p:cSld>
+    <p:spTree>
+      <p:nvGrpSpPr>
+        <p:cNvPr id="1" name=""/>
+        <p:cNvGrpSpPr/>
+        <p:nvPr/>
+      </p:nvGrpSpPr>
+      <p:grpSpPr>
+        <a:xfrm>
+          <a:off x="0" y="0"/>
+          <a:ext cx="0" cy="0"/>
+          <a:chOff x="0" y="0"/>
+          <a:chExt cx="0" cy="0"/>
+        </a:xfrm>
+      </p:grpSpPr>
+      <p:sp>
+        <p:nvSpPr>
+          <p:cNvPr id="2" name="Заголовок 1"/>
+          <p:cNvSpPr>
+            <a:spLocks noGrp="1"/>
+          </p:cNvSpPr>
+          <p:nvPr>
+            <p:ph type="title"/>
+          </p:nvPr>
+        </p:nvSpPr>
+        <p:spPr/>
+        <p:txBody>
+          <a:bodyPr/>
+          <a:lstStyle/>
+          <a:p>
+            <a:r>
+              <a:rPr lang="ru-RU" dirty="0" smtClean="0"/>
+              <a:t>Литература</a:t>
+            </a:r>
+            <a:endParaRPr lang="en-US" dirty="0"/>
+          </a:p>
+        </p:txBody>
+      </p:sp>
+      <p:sp>
+        <p:nvSpPr>
+          <p:cNvPr id="3" name="Содержимое 2"/>
+          <p:cNvSpPr>
+            <a:spLocks noGrp="1"/>
+          </p:cNvSpPr>
+          <p:nvPr>
+            <p:ph idx="1"/>
+          </p:nvPr>
+        </p:nvSpPr>
+        <p:spPr/>
+        <p:txBody>
+          <a:bodyPr/>
+          <a:lstStyle/>
+          <a:p>
+            <a:r>
+              <a:rPr lang="ru-RU" dirty="0" smtClean="0"/>
+              <a:t>Бьерн Страуструп «Язык программирования </a:t>
+            </a:r>
+            <a:r>
+              <a:rPr lang="en-US" dirty="0" smtClean="0"/>
+              <a:t>C++</a:t>
+            </a:r>
+            <a:r>
+              <a:rPr lang="ru-RU" dirty="0" smtClean="0"/>
+              <a:t>» - глава «Разработка и проектирование»</a:t>
+            </a:r>
+          </a:p>
+          <a:p>
+            <a:r>
+              <a:rPr lang="ru-RU" dirty="0" smtClean="0"/>
+              <a:t>Мартин </a:t>
+            </a:r>
+            <a:r>
+              <a:rPr lang="ru-RU" dirty="0" err="1" smtClean="0"/>
+              <a:t>Фаулер</a:t>
+            </a:r>
+            <a:r>
+              <a:rPr lang="ru-RU" dirty="0" smtClean="0"/>
+              <a:t> «</a:t>
+            </a:r>
+            <a:r>
+              <a:rPr lang="en-US" dirty="0" smtClean="0"/>
+              <a:t>UML. </a:t>
+            </a:r>
+            <a:r>
+              <a:rPr lang="ru-RU" dirty="0" smtClean="0"/>
+              <a:t>Основы»</a:t>
+            </a:r>
+            <a:endParaRPr lang="en-US" dirty="0" smtClean="0"/>
+          </a:p>
+          <a:p>
+            <a:endParaRPr lang="en-US" dirty="0"/>
+          </a:p>
+        </p:txBody>
+      </p:sp>
+    </p:spTree>
+  </p:cSld>
+  <p:clrMapOvr>
+    <a:masterClrMapping/>
+  </p:clrMapOvr>
+  <p:timing>
+    <p:tnLst>
+      <p:par>
+        <p:cTn id="1" dur="indefinite" restart="never" nodeType="tmRoot"/>
+      </p:par>
+    </p:tnLst>
+  </p:timing>
+</p:sld>
+</file>
+
+<file path=ppt/slides/slide3.xml><?xml version="1.0" encoding="utf-8"?>
+<p:sld xmlns:a="http://schemas.openxmlformats.org/drawingml/2006/main" xmlns:r="http://schemas.openxmlformats.org/officeDocument/2006/relationships" xmlns:p="http://schemas.openxmlformats.org/presentationml/2006/main">
+  <p:cSld>
+    <p:spTree>
+      <p:nvGrpSpPr>
+        <p:cNvPr id="1" name=""/>
+        <p:cNvGrpSpPr/>
+        <p:nvPr/>
+      </p:nvGrpSpPr>
+      <p:grpSpPr>
+        <a:xfrm>
+          <a:off x="0" y="0"/>
+          <a:ext cx="0" cy="0"/>
+          <a:chOff x="0" y="0"/>
+          <a:chExt cx="0" cy="0"/>
+        </a:xfrm>
+      </p:grpSpPr>
+      <p:sp>
+        <p:nvSpPr>
+          <p:cNvPr id="2" name="Заголовок 1"/>
+          <p:cNvSpPr>
+            <a:spLocks noGrp="1"/>
+          </p:cNvSpPr>
+          <p:nvPr>
+            <p:ph type="title"/>
+          </p:nvPr>
+        </p:nvSpPr>
+        <p:spPr/>
+        <p:txBody>
+          <a:bodyPr/>
+          <a:lstStyle/>
+          <a:p>
+            <a:r>
+              <a:rPr lang="ru-RU" dirty="0" smtClean="0"/>
+              <a:t>Разработка ПО</a:t>
+            </a:r>
+            <a:endParaRPr lang="en-US" dirty="0"/>
+          </a:p>
+        </p:txBody>
+      </p:sp>
+      <p:graphicFrame>
+        <p:nvGraphicFramePr>
+          <p:cNvPr id="6" name="Схема 5"/>
+          <p:cNvGraphicFramePr/>
+          <p:nvPr/>
+        </p:nvGraphicFramePr>
+        <p:xfrm>
+          <a:off x="609600" y="1295400"/>
+          <a:ext cx="7848600" cy="4038600"/>
+        </p:xfrm>
+        <a:graphic>
+          <a:graphicData uri="http://schemas.openxmlformats.org/drawingml/2006/diagram">
+            <dgm:relIds xmlns:dgm="http://schemas.openxmlformats.org/drawingml/2006/diagram" xmlns:r="http://schemas.openxmlformats.org/officeDocument/2006/relationships" r:dm="rId3" r:lo="rId4" r:qs="rId5" r:cs="rId6"/>
+          </a:graphicData>
+        </a:graphic>
+      </p:graphicFrame>
+    </p:spTree>
+  </p:cSld>
+  <p:clrMapOvr>
+    <a:masterClrMapping/>
+  </p:clrMapOvr>
+  <p:timing>
+    <p:tnLst>
+      <p:par>
+        <p:cTn id="1" dur="indefinite" restart="never" nodeType="tmRoot"/>
+      </p:par>
+    </p:tnLst>
+  </p:timing>
+</p:sld>
+</file>
+
+<file path=ppt/slides/slide4.xml><?xml version="1.0" encoding="utf-8"?>
+<p:sld xmlns:a="http://schemas.openxmlformats.org/drawingml/2006/main" xmlns:r="http://schemas.openxmlformats.org/officeDocument/2006/relationships" xmlns:p="http://schemas.openxmlformats.org/presentationml/2006/main">
+  <p:cSld>
+    <p:spTree>
+      <p:nvGrpSpPr>
+        <p:cNvPr id="1" name=""/>
+        <p:cNvGrpSpPr/>
+        <p:nvPr/>
+      </p:nvGrpSpPr>
+      <p:grpSpPr>
+        <a:xfrm>
+          <a:off x="0" y="0"/>
+          <a:ext cx="0" cy="0"/>
+          <a:chOff x="0" y="0"/>
+          <a:chExt cx="0" cy="0"/>
+        </a:xfrm>
+      </p:grpSpPr>
+      <p:sp>
+        <p:nvSpPr>
+          <p:cNvPr id="2" name="Заголовок 1"/>
+          <p:cNvSpPr>
+            <a:spLocks noGrp="1"/>
+          </p:cNvSpPr>
+          <p:nvPr>
+            <p:ph type="title"/>
+          </p:nvPr>
+        </p:nvSpPr>
+        <p:spPr/>
+        <p:txBody>
+          <a:bodyPr>
+            <a:normAutofit fontScale="90000"/>
+          </a:bodyPr>
+          <a:lstStyle/>
+          <a:p>
+            <a:r>
+              <a:rPr lang="ru-RU" sz="4900" dirty="0" smtClean="0"/>
+              <a:t>Цели проектирования </a:t>
+            </a:r>
+            <a:r>
+              <a:rPr lang="ru-RU" dirty="0" smtClean="0"/>
+              <a:t>– </a:t>
+            </a:r>
+            <a:r>
+              <a:rPr lang="ru-RU" sz="4000" dirty="0" smtClean="0"/>
+              <a:t>создание ясной и понятной архитектуры</a:t>
+            </a:r>
+            <a:endParaRPr lang="en-US" sz="4000" dirty="0"/>
+          </a:p>
+        </p:txBody>
+      </p:sp>
+      <p:sp>
+        <p:nvSpPr>
+          <p:cNvPr id="3" name="Содержимое 2"/>
+          <p:cNvSpPr>
+            <a:spLocks noGrp="1"/>
+          </p:cNvSpPr>
+          <p:nvPr>
+            <p:ph idx="1"/>
+          </p:nvPr>
+        </p:nvSpPr>
+        <p:spPr/>
+        <p:txBody>
+          <a:bodyPr/>
+          <a:lstStyle/>
+          <a:p>
+            <a:endParaRPr lang="ru-RU" dirty="0" smtClean="0"/>
+          </a:p>
+          <a:p>
+            <a:r>
+              <a:rPr lang="ru-RU" dirty="0" smtClean="0"/>
+              <a:t>тестирование</a:t>
+            </a:r>
+          </a:p>
+          <a:p>
+            <a:r>
+              <a:rPr lang="ru-RU" dirty="0" smtClean="0"/>
+              <a:t>переносимость </a:t>
+            </a:r>
+          </a:p>
+          <a:p>
+            <a:r>
+              <a:rPr lang="ru-RU" dirty="0" smtClean="0"/>
+              <a:t>поддержка </a:t>
+            </a:r>
+          </a:p>
+          <a:p>
+            <a:r>
+              <a:rPr lang="ru-RU" dirty="0" smtClean="0"/>
+              <a:t>расширение</a:t>
+            </a:r>
+          </a:p>
+          <a:p>
+            <a:r>
+              <a:rPr lang="ru-RU" dirty="0" smtClean="0"/>
+              <a:t>изменение</a:t>
+            </a:r>
+          </a:p>
+          <a:p>
+            <a:r>
+              <a:rPr lang="ru-RU" dirty="0" smtClean="0"/>
+              <a:t>понимание</a:t>
+            </a:r>
+            <a:endParaRPr lang="en-US" dirty="0"/>
+          </a:p>
+        </p:txBody>
+      </p:sp>
+      <p:pic>
+        <p:nvPicPr>
+          <p:cNvPr id="3074" name="Picture 2" descr="http://www.bigsoft.by/Media/Default/images/qa.gif"/>
+          <p:cNvPicPr>
+            <a:picLocks noChangeAspect="1" noChangeArrowheads="1"/>
+          </p:cNvPicPr>
+          <p:nvPr/>
+        </p:nvPicPr>
+        <p:blipFill>
+          <a:blip r:embed="rId2" cstate="print"/>
+          <a:srcRect/>
+          <a:stretch>
+            <a:fillRect/>
+          </a:stretch>
+        </p:blipFill>
+        <p:spPr bwMode="auto">
+          <a:xfrm>
+            <a:off x="4344391" y="1752600"/>
+            <a:ext cx="1080168" cy="1066800"/>
+          </a:xfrm>
+          <a:prstGeom prst="rect">
+            <a:avLst/>
+          </a:prstGeom>
+          <a:noFill/>
+        </p:spPr>
+      </p:pic>
+      <p:pic>
+        <p:nvPicPr>
+          <p:cNvPr id="3078" name="Picture 6" descr="http://s.lurkmore.to/images/8/85/Indian.jpg"/>
+          <p:cNvPicPr>
+            <a:picLocks noChangeAspect="1" noChangeArrowheads="1"/>
+          </p:cNvPicPr>
+          <p:nvPr/>
+        </p:nvPicPr>
+        <p:blipFill>
+          <a:blip r:embed="rId3" cstate="print"/>
+          <a:srcRect/>
+          <a:stretch>
+            <a:fillRect/>
+          </a:stretch>
+        </p:blipFill>
+        <p:spPr bwMode="auto">
+          <a:xfrm>
+            <a:off x="5334000" y="4038600"/>
+            <a:ext cx="1370609" cy="2057400"/>
+          </a:xfrm>
+          <a:prstGeom prst="rect">
+            <a:avLst/>
+          </a:prstGeom>
+          <a:noFill/>
+        </p:spPr>
+      </p:pic>
+      <p:sp>
+        <p:nvSpPr>
+          <p:cNvPr id="8" name="Выноска-облако 7"/>
+          <p:cNvSpPr/>
+          <p:nvPr/>
+        </p:nvSpPr>
+        <p:spPr>
+          <a:xfrm>
+            <a:off x="5791200" y="2590800"/>
+            <a:ext cx="2514600" cy="1143000"/>
+          </a:xfrm>
+          <a:prstGeom prst="cloudCallout">
+            <a:avLst/>
+          </a:prstGeom>
+          <a:noFill/>
+          <a:ln>
+            <a:solidFill>
+              <a:schemeClr val="tx1"/>
+            </a:solidFill>
+          </a:ln>
+        </p:spPr>
+        <p:style>
+          <a:lnRef idx="2">
+            <a:schemeClr val="accent1">
+              <a:shade val="50000"/>
+            </a:schemeClr>
+          </a:lnRef>
+          <a:fillRef idx="1">
+            <a:schemeClr val="accent1"/>
+          </a:fillRef>
+          <a:effectRef idx="0">
+            <a:schemeClr val="accent1"/>
+          </a:effectRef>
+          <a:fontRef idx="minor">
+            <a:schemeClr val="lt1"/>
+          </a:fontRef>
+        </p:style>
+        <p:txBody>
+          <a:bodyPr rtlCol="0" anchor="ctr"/>
+          <a:lstStyle/>
+          <a:p>
+            <a:pPr algn="ctr"/>
+            <a:r>
+              <a:rPr lang="en-US" dirty="0" smtClean="0">
+                <a:solidFill>
+                  <a:schemeClr val="tx1"/>
+                </a:solidFill>
+              </a:rPr>
+              <a:t>why does your code look so unusual?</a:t>
+            </a:r>
+            <a:endParaRPr lang="en-US" dirty="0">
+              <a:solidFill>
+                <a:schemeClr val="tx1"/>
+              </a:solidFill>
+            </a:endParaRPr>
+          </a:p>
+        </p:txBody>
+      </p:sp>
+    </p:spTree>
+  </p:cSld>
+  <p:clrMapOvr>
+    <a:masterClrMapping/>
+  </p:clrMapOvr>
+  <p:timing>
+    <p:tnLst>
+      <p:par>
+        <p:cTn id="1" dur="indefinite" restart="never" nodeType="tmRoot"/>
+      </p:par>
+    </p:tnLst>
+  </p:timing>
+</p:sld>
+</file>
+
+<file path=ppt/slides/slide5.xml><?xml version="1.0" encoding="utf-8"?>
+<p:sld xmlns:a="http://schemas.openxmlformats.org/drawingml/2006/main" xmlns:r="http://schemas.openxmlformats.org/officeDocument/2006/relationships" xmlns:p="http://schemas.openxmlformats.org/presentationml/2006/main">
+  <p:cSld>
+    <p:spTree>
+      <p:nvGrpSpPr>
+        <p:cNvPr id="1" name=""/>
+        <p:cNvGrpSpPr/>
+        <p:nvPr/>
+      </p:nvGrpSpPr>
+      <p:grpSpPr>
+        <a:xfrm>
+          <a:off x="0" y="0"/>
+          <a:ext cx="0" cy="0"/>
+          <a:chOff x="0" y="0"/>
+          <a:chExt cx="0" cy="0"/>
+        </a:xfrm>
+      </p:grpSpPr>
+      <p:sp>
+        <p:nvSpPr>
+          <p:cNvPr id="2" name="Заголовок 1"/>
+          <p:cNvSpPr>
+            <a:spLocks noGrp="1"/>
+          </p:cNvSpPr>
+          <p:nvPr>
+            <p:ph type="title"/>
+          </p:nvPr>
+        </p:nvSpPr>
+        <p:spPr/>
+        <p:txBody>
+          <a:bodyPr/>
+          <a:lstStyle/>
+          <a:p>
+            <a:r>
+              <a:rPr lang="ru-RU" dirty="0" smtClean="0"/>
+              <a:t>Языки моделирования</a:t>
+            </a:r>
+            <a:endParaRPr lang="en-US" dirty="0"/>
+          </a:p>
+        </p:txBody>
+      </p:sp>
+      <p:sp>
+        <p:nvSpPr>
+          <p:cNvPr id="3" name="Содержимое 2"/>
+          <p:cNvSpPr>
+            <a:spLocks noGrp="1"/>
+          </p:cNvSpPr>
+          <p:nvPr>
+            <p:ph idx="1"/>
+          </p:nvPr>
+        </p:nvSpPr>
+        <p:spPr/>
+        <p:txBody>
+          <a:bodyPr/>
+          <a:lstStyle/>
+          <a:p>
+            <a:r>
+              <a:rPr lang="en-US" b="1" dirty="0" smtClean="0"/>
+              <a:t>UML</a:t>
+            </a:r>
+            <a:r>
+              <a:rPr lang="en-US" dirty="0" smtClean="0"/>
+              <a:t> - </a:t>
+            </a:r>
+            <a:r>
+              <a:rPr lang="en-US" i="1" dirty="0"/>
+              <a:t>Unified Modeling </a:t>
+            </a:r>
+            <a:r>
+              <a:rPr lang="en-US" i="1" dirty="0" smtClean="0"/>
+              <a:t>Language</a:t>
+            </a:r>
+          </a:p>
+          <a:p>
+            <a:r>
+              <a:rPr lang="ru-RU" b="1" dirty="0" err="1" smtClean="0"/>
+              <a:t>SysML</a:t>
+            </a:r>
+            <a:r>
+              <a:rPr lang="en-US" dirty="0" smtClean="0"/>
+              <a:t> - </a:t>
+            </a:r>
+            <a:r>
+              <a:rPr lang="en-US" i="1" dirty="0"/>
+              <a:t>The Systems Modeling </a:t>
+            </a:r>
+            <a:r>
+              <a:rPr lang="en-US" i="1" dirty="0" smtClean="0"/>
+              <a:t>Language</a:t>
+            </a:r>
+          </a:p>
+          <a:p>
+            <a:r>
+              <a:rPr lang="ru-RU" b="1" dirty="0" smtClean="0"/>
+              <a:t>IDEF</a:t>
+            </a:r>
+            <a:r>
+              <a:rPr lang="en-US" dirty="0" smtClean="0"/>
+              <a:t> - </a:t>
+            </a:r>
+            <a:r>
+              <a:rPr lang="en-US" i="1" dirty="0"/>
+              <a:t>Integrated Computer-Aided </a:t>
+            </a:r>
+            <a:r>
+              <a:rPr lang="en-US" i="1" dirty="0" smtClean="0"/>
+              <a:t>Manufacturing</a:t>
+            </a:r>
+          </a:p>
+          <a:p>
+            <a:r>
+              <a:rPr lang="en-US" b="1" dirty="0" smtClean="0"/>
+              <a:t>DFD</a:t>
+            </a:r>
+            <a:r>
+              <a:rPr lang="en-US" dirty="0" smtClean="0"/>
+              <a:t> - </a:t>
+            </a:r>
+            <a:r>
+              <a:rPr lang="en-US" dirty="0"/>
+              <a:t> </a:t>
+            </a:r>
+            <a:r>
+              <a:rPr lang="en-US" i="1" dirty="0"/>
+              <a:t>Data Flow Diagrams</a:t>
+            </a:r>
+            <a:endParaRPr lang="ru-RU" dirty="0"/>
+          </a:p>
+        </p:txBody>
+      </p:sp>
+    </p:spTree>
+  </p:cSld>
+  <p:clrMapOvr>
+    <a:masterClrMapping/>
+  </p:clrMapOvr>
+  <p:timing>
+    <p:tnLst>
+      <p:par>
+        <p:cTn id="1" dur="indefinite" restart="never" nodeType="tmRoot"/>
+      </p:par>
+    </p:tnLst>
+  </p:timing>
+</p:sld>
+</file>
+
+<file path=ppt/slides/slide6.xml><?xml version="1.0" encoding="utf-8"?>
+<p:sld xmlns:a="http://schemas.openxmlformats.org/drawingml/2006/main" xmlns:r="http://schemas.openxmlformats.org/officeDocument/2006/relationships" xmlns:p="http://schemas.openxmlformats.org/presentationml/2006/main">
+  <p:cSld>
+    <p:spTree>
+      <p:nvGrpSpPr>
+        <p:cNvPr id="1" name=""/>
+        <p:cNvGrpSpPr/>
+        <p:nvPr/>
+      </p:nvGrpSpPr>
+      <p:grpSpPr>
+        <a:xfrm>
+          <a:off x="0" y="0"/>
+          <a:ext cx="0" cy="0"/>
+          <a:chOff x="0" y="0"/>
+          <a:chExt cx="0" cy="0"/>
+        </a:xfrm>
+      </p:grpSpPr>
+      <p:sp>
+        <p:nvSpPr>
+          <p:cNvPr id="7" name="Стрелка влево 6"/>
+          <p:cNvSpPr/>
+          <p:nvPr/>
+        </p:nvSpPr>
+        <p:spPr>
+          <a:xfrm rot="19682471">
+            <a:off x="2564914" y="1422884"/>
+            <a:ext cx="1330820" cy="656722"/>
+          </a:xfrm>
+          <a:prstGeom prst="leftArrow">
+            <a:avLst>
+              <a:gd name="adj1" fmla="val 60000"/>
+              <a:gd name="adj2" fmla="val 50000"/>
+            </a:avLst>
+          </a:prstGeom>
+        </p:spPr>
+        <p:style>
+          <a:lnRef idx="0">
+            <a:schemeClr val="accent1">
+              <a:tint val="60000"/>
+              <a:hueOff val="0"/>
+              <a:satOff val="0"/>
+              <a:lumOff val="0"/>
+              <a:alphaOff val="0"/>
+            </a:schemeClr>
+          </a:lnRef>
+          <a:fillRef idx="1">
+            <a:schemeClr val="accent1">
+              <a:tint val="60000"/>
+              <a:hueOff val="0"/>
+              <a:satOff val="0"/>
+              <a:lumOff val="0"/>
+              <a:alphaOff val="0"/>
+            </a:schemeClr>
+          </a:fillRef>
+          <a:effectRef idx="0">
+            <a:schemeClr val="accent1">
+              <a:tint val="60000"/>
+              <a:hueOff val="0"/>
+              <a:satOff val="0"/>
+              <a:lumOff val="0"/>
+              <a:alphaOff val="0"/>
+            </a:schemeClr>
+          </a:effectRef>
+          <a:fontRef idx="minor">
+            <a:schemeClr val="lt1"/>
+          </a:fontRef>
+        </p:style>
+      </p:sp>
+      <p:sp>
+        <p:nvSpPr>
+          <p:cNvPr id="16" name="Стрелка влево 15"/>
+          <p:cNvSpPr/>
+          <p:nvPr/>
+        </p:nvSpPr>
+        <p:spPr>
+          <a:xfrm rot="12528010">
+            <a:off x="5238210" y="1415582"/>
+            <a:ext cx="1330820" cy="656722"/>
+          </a:xfrm>
+          <a:prstGeom prst="leftArrow">
+            <a:avLst>
+              <a:gd name="adj1" fmla="val 60000"/>
+              <a:gd name="adj2" fmla="val 50000"/>
+            </a:avLst>
+          </a:prstGeom>
+        </p:spPr>
+        <p:style>
+          <a:lnRef idx="0">
+            <a:schemeClr val="accent1">
+              <a:tint val="60000"/>
+              <a:hueOff val="0"/>
+              <a:satOff val="0"/>
+              <a:lumOff val="0"/>
+              <a:alphaOff val="0"/>
+            </a:schemeClr>
+          </a:lnRef>
+          <a:fillRef idx="1">
+            <a:schemeClr val="accent1">
+              <a:tint val="60000"/>
+              <a:hueOff val="0"/>
+              <a:satOff val="0"/>
+              <a:lumOff val="0"/>
+              <a:alphaOff val="0"/>
+            </a:schemeClr>
+          </a:fillRef>
+          <a:effectRef idx="0">
+            <a:schemeClr val="accent1">
+              <a:tint val="60000"/>
+              <a:hueOff val="0"/>
+              <a:satOff val="0"/>
+              <a:lumOff val="0"/>
+              <a:alphaOff val="0"/>
+            </a:schemeClr>
+          </a:effectRef>
+          <a:fontRef idx="minor">
+            <a:schemeClr val="lt1"/>
+          </a:fontRef>
+        </p:style>
+      </p:sp>
+      <p:sp>
+        <p:nvSpPr>
+          <p:cNvPr id="17" name="Стрелка влево 16"/>
+          <p:cNvSpPr/>
+          <p:nvPr/>
+        </p:nvSpPr>
+        <p:spPr>
+          <a:xfrm rot="16200000">
+            <a:off x="3883029" y="2470649"/>
+            <a:ext cx="1330820" cy="656722"/>
+          </a:xfrm>
+          <a:prstGeom prst="leftArrow">
+            <a:avLst>
+              <a:gd name="adj1" fmla="val 60000"/>
+              <a:gd name="adj2" fmla="val 50000"/>
+            </a:avLst>
+          </a:prstGeom>
+        </p:spPr>
+        <p:style>
+          <a:lnRef idx="0">
+            <a:schemeClr val="accent1">
+              <a:tint val="60000"/>
+              <a:hueOff val="0"/>
+              <a:satOff val="0"/>
+              <a:lumOff val="0"/>
+              <a:alphaOff val="0"/>
+            </a:schemeClr>
+          </a:lnRef>
+          <a:fillRef idx="1">
+            <a:schemeClr val="accent1">
+              <a:tint val="60000"/>
+              <a:hueOff val="0"/>
+              <a:satOff val="0"/>
+              <a:lumOff val="0"/>
+              <a:alphaOff val="0"/>
+            </a:schemeClr>
+          </a:fillRef>
+          <a:effectRef idx="0">
+            <a:schemeClr val="accent1">
+              <a:tint val="60000"/>
+              <a:hueOff val="0"/>
+              <a:satOff val="0"/>
+              <a:lumOff val="0"/>
+              <a:alphaOff val="0"/>
+            </a:schemeClr>
+          </a:effectRef>
+          <a:fontRef idx="minor">
+            <a:schemeClr val="lt1"/>
+          </a:fontRef>
+        </p:style>
+      </p:sp>
+      <p:sp>
+        <p:nvSpPr>
+          <p:cNvPr id="18" name="Стрелка влево 17"/>
+          <p:cNvSpPr/>
+          <p:nvPr/>
+        </p:nvSpPr>
+        <p:spPr>
+          <a:xfrm rot="18690202">
+            <a:off x="3219731" y="4502369"/>
+            <a:ext cx="1330820" cy="656722"/>
+          </a:xfrm>
+          <a:prstGeom prst="leftArrow">
+            <a:avLst>
+              <a:gd name="adj1" fmla="val 60000"/>
+              <a:gd name="adj2" fmla="val 50000"/>
+            </a:avLst>
+          </a:prstGeom>
+        </p:spPr>
+        <p:style>
+          <a:lnRef idx="0">
+            <a:schemeClr val="accent1">
+              <a:tint val="60000"/>
+              <a:hueOff val="0"/>
+              <a:satOff val="0"/>
+              <a:lumOff val="0"/>
+              <a:alphaOff val="0"/>
+            </a:schemeClr>
+          </a:lnRef>
+          <a:fillRef idx="1">
+            <a:schemeClr val="accent1">
+              <a:tint val="60000"/>
+              <a:hueOff val="0"/>
+              <a:satOff val="0"/>
+              <a:lumOff val="0"/>
+              <a:alphaOff val="0"/>
+            </a:schemeClr>
+          </a:fillRef>
+          <a:effectRef idx="0">
+            <a:schemeClr val="accent1">
+              <a:tint val="60000"/>
+              <a:hueOff val="0"/>
+              <a:satOff val="0"/>
+              <a:lumOff val="0"/>
+              <a:alphaOff val="0"/>
+            </a:schemeClr>
+          </a:effectRef>
+          <a:fontRef idx="minor">
+            <a:schemeClr val="lt1"/>
+          </a:fontRef>
+        </p:style>
+      </p:sp>
+      <p:sp>
+        <p:nvSpPr>
+          <p:cNvPr id="19" name="Стрелка влево 18"/>
+          <p:cNvSpPr/>
+          <p:nvPr/>
+        </p:nvSpPr>
+        <p:spPr>
+          <a:xfrm rot="13519859">
+            <a:off x="4558360" y="4506069"/>
+            <a:ext cx="1330820" cy="656722"/>
+          </a:xfrm>
+          <a:prstGeom prst="leftArrow">
+            <a:avLst>
+              <a:gd name="adj1" fmla="val 60000"/>
+              <a:gd name="adj2" fmla="val 50000"/>
+            </a:avLst>
+          </a:prstGeom>
+        </p:spPr>
+        <p:style>
+          <a:lnRef idx="0">
+            <a:schemeClr val="accent1">
+              <a:tint val="60000"/>
+              <a:hueOff val="0"/>
+              <a:satOff val="0"/>
+              <a:lumOff val="0"/>
+              <a:alphaOff val="0"/>
+            </a:schemeClr>
+          </a:lnRef>
+          <a:fillRef idx="1">
+            <a:schemeClr val="accent1">
+              <a:tint val="60000"/>
+              <a:hueOff val="0"/>
+              <a:satOff val="0"/>
+              <a:lumOff val="0"/>
+              <a:alphaOff val="0"/>
+            </a:schemeClr>
+          </a:fillRef>
+          <a:effectRef idx="0">
+            <a:schemeClr val="accent1">
+              <a:tint val="60000"/>
+              <a:hueOff val="0"/>
+              <a:satOff val="0"/>
+              <a:lumOff val="0"/>
+              <a:alphaOff val="0"/>
+            </a:schemeClr>
+          </a:effectRef>
+          <a:fontRef idx="minor">
+            <a:schemeClr val="lt1"/>
+          </a:fontRef>
+        </p:style>
+      </p:sp>
+      <p:grpSp>
+        <p:nvGrpSpPr>
+          <p:cNvPr id="20" name="Группа 19"/>
+          <p:cNvGrpSpPr/>
+          <p:nvPr/>
+        </p:nvGrpSpPr>
+        <p:grpSpPr>
+          <a:xfrm>
+            <a:off x="76200" y="1600200"/>
+            <a:ext cx="2225511" cy="1197738"/>
+            <a:chOff x="6012539" y="1542963"/>
+            <a:chExt cx="1768311" cy="1197738"/>
+          </a:xfrm>
+          <a:solidFill>
+            <a:srgbClr val="92D050"/>
+          </a:solidFill>
+        </p:grpSpPr>
+        <p:sp>
+          <p:nvSpPr>
+            <p:cNvPr id="21" name="Скругленный прямоугольник 20"/>
+            <p:cNvSpPr/>
+            <p:nvPr/>
+          </p:nvSpPr>
+          <p:spPr>
+            <a:xfrm>
+              <a:off x="6012539" y="1542963"/>
+              <a:ext cx="1768311" cy="1197738"/>
+            </a:xfrm>
+            <a:prstGeom prst="roundRect">
+              <a:avLst>
+                <a:gd name="adj" fmla="val 10000"/>
+              </a:avLst>
+            </a:prstGeom>
+            <a:grpFill/>
+          </p:spPr>
+          <p:style>
+            <a:lnRef idx="2">
+              <a:schemeClr val="lt1">
+                <a:hueOff val="0"/>
+                <a:satOff val="0"/>
+                <a:lumOff val="0"/>
+                <a:alphaOff val="0"/>
+              </a:schemeClr>
+            </a:lnRef>
+            <a:fillRef idx="1">
+              <a:schemeClr val="accent1">
+                <a:hueOff val="0"/>
+                <a:satOff val="0"/>
+                <a:lumOff val="0"/>
+                <a:alphaOff val="0"/>
+              </a:schemeClr>
+            </a:fillRef>
+            <a:effectRef idx="0">
+              <a:schemeClr val="accent1">
+                <a:hueOff val="0"/>
+                <a:satOff val="0"/>
+                <a:lumOff val="0"/>
+                <a:alphaOff val="0"/>
+              </a:schemeClr>
+            </a:effectRef>
+            <a:fontRef idx="minor">
+              <a:schemeClr val="lt1"/>
+            </a:fontRef>
+          </p:style>
+        </p:sp>
+        <p:sp>
+          <p:nvSpPr>
+            <p:cNvPr id="22" name="Скругленный прямоугольник 4"/>
+            <p:cNvSpPr/>
+            <p:nvPr/>
+          </p:nvSpPr>
+          <p:spPr>
+            <a:xfrm>
+              <a:off x="6047620" y="1578044"/>
+              <a:ext cx="1698149" cy="1127576"/>
+            </a:xfrm>
+            <a:prstGeom prst="rect">
+              <a:avLst/>
+            </a:prstGeom>
+            <a:grpFill/>
+          </p:spPr>
+          <p:style>
+            <a:lnRef idx="0">
+              <a:scrgbClr r="0" g="0" b="0"/>
+            </a:lnRef>
+            <a:fillRef idx="0">
+              <a:scrgbClr r="0" g="0" b="0"/>
+            </a:fillRef>
+            <a:effectRef idx="0">
+              <a:scrgbClr r="0" g="0" b="0"/>
+            </a:effectRef>
+            <a:fontRef idx="minor">
+              <a:schemeClr val="lt1"/>
+            </a:fontRef>
+          </p:style>
+          <p:txBody>
+            <a:bodyPr spcFirstLastPara="0" vert="horz" wrap="square" lIns="30480" tIns="30480" rIns="30480" bIns="30480" numCol="1" spcCol="1270" anchor="ctr" anchorCtr="0">
+              <a:noAutofit/>
+            </a:bodyPr>
+            <a:lstStyle/>
+            <a:p>
+              <a:pPr lvl="0" algn="ctr" defTabSz="711200">
+                <a:lnSpc>
+                  <a:spcPct val="90000"/>
+                </a:lnSpc>
+                <a:spcBef>
+                  <a:spcPct val="0"/>
+                </a:spcBef>
+                <a:spcAft>
+                  <a:spcPct val="35000"/>
+                </a:spcAft>
+              </a:pPr>
+              <a:r>
+                <a:rPr lang="ru-RU" sz="2400" b="1" kern="1200" dirty="0" err="1" smtClean="0"/>
+                <a:t>Эскизирование</a:t>
+              </a:r>
+              <a:endParaRPr lang="en-US" sz="2400" b="1" kern="1200" dirty="0"/>
+            </a:p>
+          </p:txBody>
+        </p:sp>
+      </p:grpSp>
+      <p:grpSp>
+        <p:nvGrpSpPr>
+          <p:cNvPr id="23" name="Группа 22"/>
+          <p:cNvGrpSpPr/>
+          <p:nvPr/>
+        </p:nvGrpSpPr>
+        <p:grpSpPr>
+          <a:xfrm>
+            <a:off x="6705600" y="1524000"/>
+            <a:ext cx="2362200" cy="1295400"/>
+            <a:chOff x="6012539" y="1542963"/>
+            <a:chExt cx="1768311" cy="1197738"/>
+          </a:xfrm>
+          <a:solidFill>
+            <a:srgbClr val="92D050"/>
+          </a:solidFill>
+        </p:grpSpPr>
+        <p:sp>
+          <p:nvSpPr>
+            <p:cNvPr id="24" name="Скругленный прямоугольник 23"/>
+            <p:cNvSpPr/>
+            <p:nvPr/>
+          </p:nvSpPr>
+          <p:spPr>
+            <a:xfrm>
+              <a:off x="6012539" y="1542963"/>
+              <a:ext cx="1768311" cy="1197738"/>
+            </a:xfrm>
+            <a:prstGeom prst="roundRect">
+              <a:avLst>
+                <a:gd name="adj" fmla="val 10000"/>
+              </a:avLst>
+            </a:prstGeom>
+            <a:grpFill/>
+          </p:spPr>
+          <p:style>
+            <a:lnRef idx="2">
+              <a:schemeClr val="lt1">
+                <a:hueOff val="0"/>
+                <a:satOff val="0"/>
+                <a:lumOff val="0"/>
+                <a:alphaOff val="0"/>
+              </a:schemeClr>
+            </a:lnRef>
+            <a:fillRef idx="1">
+              <a:schemeClr val="accent1">
+                <a:hueOff val="0"/>
+                <a:satOff val="0"/>
+                <a:lumOff val="0"/>
+                <a:alphaOff val="0"/>
+              </a:schemeClr>
+            </a:fillRef>
+            <a:effectRef idx="0">
+              <a:schemeClr val="accent1">
+                <a:hueOff val="0"/>
+                <a:satOff val="0"/>
+                <a:lumOff val="0"/>
+                <a:alphaOff val="0"/>
+              </a:schemeClr>
+            </a:effectRef>
+            <a:fontRef idx="minor">
+              <a:schemeClr val="lt1"/>
+            </a:fontRef>
+          </p:style>
+        </p:sp>
+        <p:sp>
+          <p:nvSpPr>
+            <p:cNvPr id="25" name="Скругленный прямоугольник 4"/>
+            <p:cNvSpPr/>
+            <p:nvPr/>
+          </p:nvSpPr>
+          <p:spPr>
+            <a:xfrm>
+              <a:off x="6047620" y="1578044"/>
+              <a:ext cx="1698149" cy="1127576"/>
+            </a:xfrm>
+            <a:prstGeom prst="rect">
+              <a:avLst/>
+            </a:prstGeom>
+            <a:grpFill/>
+          </p:spPr>
+          <p:style>
+            <a:lnRef idx="0">
+              <a:scrgbClr r="0" g="0" b="0"/>
+            </a:lnRef>
+            <a:fillRef idx="0">
+              <a:scrgbClr r="0" g="0" b="0"/>
+            </a:fillRef>
+            <a:effectRef idx="0">
+              <a:scrgbClr r="0" g="0" b="0"/>
+            </a:effectRef>
+            <a:fontRef idx="minor">
+              <a:schemeClr val="lt1"/>
+            </a:fontRef>
+          </p:style>
+          <p:txBody>
+            <a:bodyPr spcFirstLastPara="0" vert="horz" wrap="square" lIns="30480" tIns="30480" rIns="30480" bIns="30480" numCol="1" spcCol="1270" anchor="ctr" anchorCtr="0">
+              <a:noAutofit/>
+            </a:bodyPr>
+            <a:lstStyle/>
+            <a:p>
+              <a:pPr lvl="0" algn="ctr" defTabSz="711200">
+                <a:lnSpc>
+                  <a:spcPct val="90000"/>
+                </a:lnSpc>
+                <a:spcBef>
+                  <a:spcPct val="0"/>
+                </a:spcBef>
+                <a:spcAft>
+                  <a:spcPct val="35000"/>
+                </a:spcAft>
+              </a:pPr>
+              <a:r>
+                <a:rPr lang="ru-RU" sz="2000" b="1" kern="1200" dirty="0" smtClean="0"/>
                 <a:t>Язык программирования</a:t>
               </a:r>
-              <a:endParaRPr lang="en-US" sz="1500" b="1" kern="1200" dirty="0"/>
+              <a:endParaRPr lang="en-US" sz="2000" b="1" kern="1200" dirty="0"/>
             </a:p>
           </p:txBody>
         </p:sp>
@@ -8611,8 +10661,8 @@
         </p:nvGrpSpPr>
         <p:grpSpPr>
           <a:xfrm>
-            <a:off x="3618969" y="3581400"/>
-            <a:ext cx="1768311" cy="1197738"/>
+            <a:off x="3200400" y="3581400"/>
+            <a:ext cx="2627019" cy="1197738"/>
             <a:chOff x="6012539" y="1542963"/>
             <a:chExt cx="1768311" cy="1197738"/>
           </a:xfrm>
@@ -8716,10 +10766,10 @@
                 </a:spcAft>
               </a:pPr>
               <a:r>
-                <a:rPr lang="ru-RU" sz="1600" b="1" kern="1200" dirty="0" smtClean="0"/>
+                <a:rPr lang="ru-RU" sz="2400" b="1" kern="1200" dirty="0" smtClean="0"/>
                 <a:t>Проектирование</a:t>
               </a:r>
-              <a:endParaRPr lang="en-US" sz="1600" b="1" kern="1200" dirty="0"/>
+              <a:endParaRPr lang="en-US" sz="2400" b="1" kern="1200" dirty="0"/>
             </a:p>
           </p:txBody>
         </p:sp>
@@ -8733,7 +10783,7 @@
         <p:grpSpPr>
           <a:xfrm>
             <a:off x="2133601" y="5410200"/>
-            <a:ext cx="1295399" cy="762000"/>
+            <a:ext cx="1835081" cy="990600"/>
             <a:chOff x="6012539" y="1542963"/>
             <a:chExt cx="1768311" cy="1197738"/>
           </a:xfrm>
@@ -8797,7 +10847,7 @@
           </p:nvSpPr>
           <p:spPr>
             <a:xfrm>
-              <a:off x="6047620" y="1578044"/>
+              <a:off x="6047620" y="1578045"/>
               <a:ext cx="1698149" cy="1127576"/>
             </a:xfrm>
             <a:prstGeom prst="rect">
@@ -8837,10 +10887,10 @@
                 </a:spcAft>
               </a:pPr>
               <a:r>
-                <a:rPr lang="ru-RU" sz="1600" b="1" kern="1200" dirty="0" smtClean="0"/>
+                <a:rPr lang="ru-RU" sz="2400" b="1" kern="1200" dirty="0" smtClean="0"/>
                 <a:t>Прямое</a:t>
               </a:r>
-              <a:endParaRPr lang="en-US" sz="1600" b="1" kern="1200" dirty="0"/>
+              <a:endParaRPr lang="en-US" sz="2400" b="1" kern="1200" dirty="0"/>
             </a:p>
           </p:txBody>
         </p:sp>
@@ -8853,8 +10903,8 @@
         </p:nvGrpSpPr>
         <p:grpSpPr>
           <a:xfrm>
-            <a:off x="5562601" y="5410200"/>
-            <a:ext cx="1295399" cy="762000"/>
+            <a:off x="4841416" y="5410199"/>
+            <a:ext cx="2016585" cy="1035555"/>
             <a:chOff x="6012539" y="1542963"/>
             <a:chExt cx="1768311" cy="1197738"/>
           </a:xfrm>
@@ -8958,10 +11008,10 @@
                 </a:spcAft>
               </a:pPr>
               <a:r>
-                <a:rPr lang="ru-RU" sz="1600" b="1" dirty="0" smtClean="0"/>
+                <a:rPr lang="ru-RU" sz="2400" b="1" dirty="0" smtClean="0"/>
                 <a:t>Обратное</a:t>
               </a:r>
-              <a:endParaRPr lang="en-US" sz="1600" b="1" kern="1200" dirty="0"/>
+              <a:endParaRPr lang="en-US" sz="2400" b="1" kern="1200" dirty="0"/>
             </a:p>
           </p:txBody>
         </p:sp>
@@ -9281,7 +11331,35 @@
             </a:pPr>
             <a:r>
               <a:rPr lang="ru-RU" dirty="0" smtClean="0"/>
-              <a:t>набор библиотек и тестов к ним, обеспечивающий получение, обработку и интерфейс для дальнейшей передачи торговых сообщений</a:t>
+              <a:t>набор библиотек и тестов к ним, обеспечивающий </a:t>
+            </a:r>
+            <a:r>
+              <a:rPr lang="ru-RU" dirty="0" smtClean="0"/>
+              <a:t>получение и обработку</a:t>
+            </a:r>
+            <a:r>
+              <a:rPr lang="en-US" dirty="0" smtClean="0"/>
+              <a:t> </a:t>
+            </a:r>
+            <a:r>
+              <a:rPr lang="ru-RU" dirty="0"/>
+              <a:t>торговых </a:t>
+            </a:r>
+            <a:r>
+              <a:rPr lang="ru-RU" dirty="0" smtClean="0"/>
+              <a:t>сообщений, а также </a:t>
+            </a:r>
+            <a:r>
+              <a:rPr lang="ru-RU" dirty="0" smtClean="0"/>
+              <a:t>интерфейс </a:t>
+            </a:r>
+            <a:r>
+              <a:rPr lang="ru-RU" dirty="0" smtClean="0"/>
+              <a:t>для </a:t>
+            </a:r>
+            <a:r>
+              <a:rPr lang="ru-RU" dirty="0" smtClean="0"/>
+              <a:t>дальнейшего их использования</a:t>
             </a:r>
             <a:endParaRPr lang="en-US" dirty="0" smtClean="0"/>
           </a:p>

</xml_diff>